<commit_message>
add picture for specification structure
</commit_message>
<xml_diff>
--- a/docs/ocm/modelmapping/oci/OCM-Implementation-Model.pptx
+++ b/docs/ocm/modelmapping/oci/OCM-Implementation-Model.pptx
@@ -265,7 +265,7 @@
           <a:p>
             <a:fld id="{BEEC5A5A-C34E-462D-A18F-97AFFCCC6197}" type="datetimeFigureOut">
               <a:rPr lang="en-NL" smtClean="0"/>
-              <a:t>08/10/2022</a:t>
+              <a:t>08/13/2022</a:t>
             </a:fld>
             <a:endParaRPr lang="en-NL"/>
           </a:p>
@@ -465,7 +465,7 @@
           <a:p>
             <a:fld id="{BEEC5A5A-C34E-462D-A18F-97AFFCCC6197}" type="datetimeFigureOut">
               <a:rPr lang="en-NL" smtClean="0"/>
-              <a:t>08/10/2022</a:t>
+              <a:t>08/13/2022</a:t>
             </a:fld>
             <a:endParaRPr lang="en-NL"/>
           </a:p>
@@ -675,7 +675,7 @@
           <a:p>
             <a:fld id="{BEEC5A5A-C34E-462D-A18F-97AFFCCC6197}" type="datetimeFigureOut">
               <a:rPr lang="en-NL" smtClean="0"/>
-              <a:t>08/10/2022</a:t>
+              <a:t>08/13/2022</a:t>
             </a:fld>
             <a:endParaRPr lang="en-NL"/>
           </a:p>
@@ -875,7 +875,7 @@
           <a:p>
             <a:fld id="{BEEC5A5A-C34E-462D-A18F-97AFFCCC6197}" type="datetimeFigureOut">
               <a:rPr lang="en-NL" smtClean="0"/>
-              <a:t>08/10/2022</a:t>
+              <a:t>08/13/2022</a:t>
             </a:fld>
             <a:endParaRPr lang="en-NL"/>
           </a:p>
@@ -1151,7 +1151,7 @@
           <a:p>
             <a:fld id="{BEEC5A5A-C34E-462D-A18F-97AFFCCC6197}" type="datetimeFigureOut">
               <a:rPr lang="en-NL" smtClean="0"/>
-              <a:t>08/10/2022</a:t>
+              <a:t>08/13/2022</a:t>
             </a:fld>
             <a:endParaRPr lang="en-NL"/>
           </a:p>
@@ -1419,7 +1419,7 @@
           <a:p>
             <a:fld id="{BEEC5A5A-C34E-462D-A18F-97AFFCCC6197}" type="datetimeFigureOut">
               <a:rPr lang="en-NL" smtClean="0"/>
-              <a:t>08/10/2022</a:t>
+              <a:t>08/13/2022</a:t>
             </a:fld>
             <a:endParaRPr lang="en-NL"/>
           </a:p>
@@ -1834,7 +1834,7 @@
           <a:p>
             <a:fld id="{BEEC5A5A-C34E-462D-A18F-97AFFCCC6197}" type="datetimeFigureOut">
               <a:rPr lang="en-NL" smtClean="0"/>
-              <a:t>08/10/2022</a:t>
+              <a:t>08/13/2022</a:t>
             </a:fld>
             <a:endParaRPr lang="en-NL"/>
           </a:p>
@@ -1976,7 +1976,7 @@
           <a:p>
             <a:fld id="{BEEC5A5A-C34E-462D-A18F-97AFFCCC6197}" type="datetimeFigureOut">
               <a:rPr lang="en-NL" smtClean="0"/>
-              <a:t>08/10/2022</a:t>
+              <a:t>08/13/2022</a:t>
             </a:fld>
             <a:endParaRPr lang="en-NL"/>
           </a:p>
@@ -2089,7 +2089,7 @@
           <a:p>
             <a:fld id="{BEEC5A5A-C34E-462D-A18F-97AFFCCC6197}" type="datetimeFigureOut">
               <a:rPr lang="en-NL" smtClean="0"/>
-              <a:t>08/10/2022</a:t>
+              <a:t>08/13/2022</a:t>
             </a:fld>
             <a:endParaRPr lang="en-NL"/>
           </a:p>
@@ -2402,7 +2402,7 @@
           <a:p>
             <a:fld id="{BEEC5A5A-C34E-462D-A18F-97AFFCCC6197}" type="datetimeFigureOut">
               <a:rPr lang="en-NL" smtClean="0"/>
-              <a:t>08/10/2022</a:t>
+              <a:t>08/13/2022</a:t>
             </a:fld>
             <a:endParaRPr lang="en-NL"/>
           </a:p>
@@ -2691,7 +2691,7 @@
           <a:p>
             <a:fld id="{BEEC5A5A-C34E-462D-A18F-97AFFCCC6197}" type="datetimeFigureOut">
               <a:rPr lang="en-NL" smtClean="0"/>
-              <a:t>08/10/2022</a:t>
+              <a:t>08/13/2022</a:t>
             </a:fld>
             <a:endParaRPr lang="en-NL"/>
           </a:p>
@@ -2934,7 +2934,7 @@
           <a:p>
             <a:fld id="{BEEC5A5A-C34E-462D-A18F-97AFFCCC6197}" type="datetimeFigureOut">
               <a:rPr lang="en-NL" smtClean="0"/>
-              <a:t>08/10/2022</a:t>
+              <a:t>08/13/2022</a:t>
             </a:fld>
             <a:endParaRPr lang="en-NL"/>
           </a:p>
@@ -7741,6 +7741,7 @@
             <a:avLst/>
           </a:prstGeom>
           <a:noFill/>
+          <a:ln w="25400"/>
         </p:spPr>
         <p:style>
           <a:lnRef idx="2">
@@ -7787,6 +7788,7 @@
           <a:prstGeom prst="rect">
             <a:avLst/>
           </a:prstGeom>
+          <a:ln w="25400"/>
         </p:spPr>
         <p:style>
           <a:lnRef idx="2">
@@ -9821,1970 +9823,1991 @@
           <a:chExt cx="0" cy="0"/>
         </a:xfrm>
       </p:grpSpPr>
-      <p:sp>
-        <p:nvSpPr>
-          <p:cNvPr id="2" name="TextBox 1">
-            <a:extLst>
-              <a:ext uri="{FF2B5EF4-FFF2-40B4-BE49-F238E27FC236}">
-                <a16:creationId xmlns:a16="http://schemas.microsoft.com/office/drawing/2014/main" id="{265E7B79-E624-4D75-A00B-FFAE1AE76551}"/>
-              </a:ext>
-            </a:extLst>
-          </p:cNvPr>
-          <p:cNvSpPr txBox="1"/>
+      <p:grpSp>
+        <p:nvGrpSpPr>
+          <p:cNvPr id="18" name="Group 17">
+            <a:extLst>
+              <a:ext uri="{FF2B5EF4-FFF2-40B4-BE49-F238E27FC236}">
+                <a16:creationId xmlns:a16="http://schemas.microsoft.com/office/drawing/2014/main" id="{2BBAB53E-CD57-4E52-8F36-77AA500E8DD8}"/>
+              </a:ext>
+            </a:extLst>
+          </p:cNvPr>
+          <p:cNvGrpSpPr/>
           <p:nvPr/>
-        </p:nvSpPr>
-        <p:spPr>
+        </p:nvGrpSpPr>
+        <p:grpSpPr>
           <a:xfrm>
-            <a:off x="565484" y="5173579"/>
-            <a:ext cx="1294842" cy="369332"/>
-          </a:xfrm>
-          <a:prstGeom prst="rect">
-            <a:avLst/>
-          </a:prstGeom>
-          <a:noFill/>
-        </p:spPr>
-        <p:txBody>
-          <a:bodyPr wrap="none" rtlCol="0">
-            <a:spAutoFit/>
-          </a:bodyPr>
-          <a:lstStyle/>
-          <a:p>
-            <a:r>
-              <a:rPr lang="en-US" dirty="0">
-                <a:solidFill>
-                  <a:schemeClr val="accent1"/>
-                </a:solidFill>
-              </a:rPr>
-              <a:t>OCI  Layer 1</a:t>
-            </a:r>
-          </a:p>
-        </p:txBody>
-      </p:sp>
-      <p:sp>
-        <p:nvSpPr>
-          <p:cNvPr id="3" name="TextBox 2">
-            <a:extLst>
-              <a:ext uri="{FF2B5EF4-FFF2-40B4-BE49-F238E27FC236}">
-                <a16:creationId xmlns:a16="http://schemas.microsoft.com/office/drawing/2014/main" id="{72BDB7C9-CC2B-41C6-9842-DFFA4A81A501}"/>
-              </a:ext>
-            </a:extLst>
-          </p:cNvPr>
-          <p:cNvSpPr txBox="1"/>
-          <p:nvPr/>
-        </p:nvSpPr>
-        <p:spPr>
-          <a:xfrm>
-            <a:off x="3886200" y="5563321"/>
-            <a:ext cx="1692451" cy="369332"/>
-          </a:xfrm>
-          <a:prstGeom prst="rect">
-            <a:avLst/>
-          </a:prstGeom>
-          <a:noFill/>
-        </p:spPr>
-        <p:txBody>
-          <a:bodyPr wrap="none" rtlCol="0">
-            <a:spAutoFit/>
-          </a:bodyPr>
-          <a:lstStyle/>
-          <a:p>
-            <a:r>
-              <a:rPr lang="en-US" dirty="0" err="1">
-                <a:solidFill>
-                  <a:schemeClr val="accent1"/>
-                </a:solidFill>
-              </a:rPr>
-              <a:t>ImageManifest</a:t>
-            </a:r>
-            <a:r>
-              <a:rPr lang="en-US" dirty="0">
-                <a:solidFill>
-                  <a:schemeClr val="accent1"/>
-                </a:solidFill>
-              </a:rPr>
-              <a:t> </a:t>
-            </a:r>
-          </a:p>
-        </p:txBody>
-      </p:sp>
-      <p:sp>
-        <p:nvSpPr>
-          <p:cNvPr id="4" name="TextBox 3">
-            <a:extLst>
-              <a:ext uri="{FF2B5EF4-FFF2-40B4-BE49-F238E27FC236}">
-                <a16:creationId xmlns:a16="http://schemas.microsoft.com/office/drawing/2014/main" id="{18F994F1-F8AC-4B0B-A052-B71D19355A9C}"/>
-              </a:ext>
-            </a:extLst>
-          </p:cNvPr>
-          <p:cNvSpPr txBox="1"/>
-          <p:nvPr/>
-        </p:nvSpPr>
-        <p:spPr>
-          <a:xfrm>
-            <a:off x="6787137" y="5562238"/>
-            <a:ext cx="1577098" cy="369332"/>
-          </a:xfrm>
-          <a:prstGeom prst="rect">
-            <a:avLst/>
-          </a:prstGeom>
-          <a:noFill/>
-        </p:spPr>
-        <p:txBody>
-          <a:bodyPr wrap="none" rtlCol="0">
-            <a:spAutoFit/>
-          </a:bodyPr>
-          <a:lstStyle/>
-          <a:p>
-            <a:r>
-              <a:rPr lang="en-US" dirty="0" err="1">
-                <a:solidFill>
-                  <a:schemeClr val="accent1"/>
-                </a:solidFill>
-              </a:rPr>
-              <a:t>IndexManifest</a:t>
-            </a:r>
-            <a:r>
-              <a:rPr lang="en-US" dirty="0">
-                <a:solidFill>
-                  <a:schemeClr val="accent1"/>
-                </a:solidFill>
-              </a:rPr>
-              <a:t> </a:t>
-            </a:r>
-          </a:p>
-        </p:txBody>
-      </p:sp>
-      <p:sp>
-        <p:nvSpPr>
-          <p:cNvPr id="5" name="TextBox 4">
-            <a:extLst>
-              <a:ext uri="{FF2B5EF4-FFF2-40B4-BE49-F238E27FC236}">
-                <a16:creationId xmlns:a16="http://schemas.microsoft.com/office/drawing/2014/main" id="{9B334D95-57C2-4D52-9BF5-62B042F809E2}"/>
-              </a:ext>
-            </a:extLst>
-          </p:cNvPr>
-          <p:cNvSpPr txBox="1"/>
-          <p:nvPr/>
-        </p:nvSpPr>
-        <p:spPr>
-          <a:xfrm>
-            <a:off x="3245384" y="5967663"/>
-            <a:ext cx="685701" cy="369332"/>
-          </a:xfrm>
-          <a:prstGeom prst="rect">
-            <a:avLst/>
-          </a:prstGeom>
-          <a:noFill/>
-        </p:spPr>
-        <p:txBody>
-          <a:bodyPr wrap="none" rtlCol="0">
-            <a:spAutoFit/>
-          </a:bodyPr>
-          <a:lstStyle/>
-          <a:p>
-            <a:r>
-              <a:rPr lang="en-US" dirty="0">
-                <a:solidFill>
-                  <a:schemeClr val="accent1"/>
-                </a:solidFill>
-              </a:rPr>
-              <a:t>Layer</a:t>
-            </a:r>
-          </a:p>
-        </p:txBody>
-      </p:sp>
-      <p:sp>
-        <p:nvSpPr>
-          <p:cNvPr id="6" name="TextBox 5">
-            <a:extLst>
-              <a:ext uri="{FF2B5EF4-FFF2-40B4-BE49-F238E27FC236}">
-                <a16:creationId xmlns:a16="http://schemas.microsoft.com/office/drawing/2014/main" id="{C8BB9A7A-A29D-442C-8893-06BF1A29BF0A}"/>
-              </a:ext>
-            </a:extLst>
-          </p:cNvPr>
-          <p:cNvSpPr txBox="1"/>
-          <p:nvPr/>
-        </p:nvSpPr>
-        <p:spPr>
-          <a:xfrm>
-            <a:off x="4985952" y="5943600"/>
-            <a:ext cx="782843" cy="369332"/>
-          </a:xfrm>
-          <a:prstGeom prst="rect">
-            <a:avLst/>
-          </a:prstGeom>
-          <a:noFill/>
-        </p:spPr>
-        <p:txBody>
-          <a:bodyPr wrap="none" rtlCol="0">
-            <a:spAutoFit/>
-          </a:bodyPr>
-          <a:lstStyle/>
-          <a:p>
-            <a:r>
-              <a:rPr lang="en-US" dirty="0">
-                <a:solidFill>
-                  <a:schemeClr val="accent1"/>
-                </a:solidFill>
-              </a:rPr>
-              <a:t>Config</a:t>
-            </a:r>
-          </a:p>
-        </p:txBody>
-      </p:sp>
-      <p:sp>
-        <p:nvSpPr>
-          <p:cNvPr id="7" name="TextBox 6">
-            <a:extLst>
-              <a:ext uri="{FF2B5EF4-FFF2-40B4-BE49-F238E27FC236}">
-                <a16:creationId xmlns:a16="http://schemas.microsoft.com/office/drawing/2014/main" id="{1122DB26-D9A6-4FAD-B270-2200DD7F9A2E}"/>
-              </a:ext>
-            </a:extLst>
-          </p:cNvPr>
-          <p:cNvSpPr txBox="1"/>
-          <p:nvPr/>
-        </p:nvSpPr>
-        <p:spPr>
-          <a:xfrm>
-            <a:off x="6110097" y="5967663"/>
-            <a:ext cx="1702646" cy="369332"/>
-          </a:xfrm>
-          <a:prstGeom prst="rect">
-            <a:avLst/>
-          </a:prstGeom>
-          <a:noFill/>
-        </p:spPr>
-        <p:txBody>
-          <a:bodyPr wrap="none" rtlCol="0">
-            <a:spAutoFit/>
-          </a:bodyPr>
-          <a:lstStyle/>
-          <a:p>
-            <a:r>
-              <a:rPr lang="en-US" dirty="0">
-                <a:solidFill>
-                  <a:schemeClr val="accent1"/>
-                </a:solidFill>
-              </a:rPr>
-              <a:t>Blob(descriptor)</a:t>
-            </a:r>
-          </a:p>
-        </p:txBody>
-      </p:sp>
-      <p:sp>
-        <p:nvSpPr>
-          <p:cNvPr id="8" name="TextBox 7">
-            <a:extLst>
-              <a:ext uri="{FF2B5EF4-FFF2-40B4-BE49-F238E27FC236}">
-                <a16:creationId xmlns:a16="http://schemas.microsoft.com/office/drawing/2014/main" id="{1BF88E12-8DF0-47E1-8CEA-848703151515}"/>
-              </a:ext>
-            </a:extLst>
-          </p:cNvPr>
-          <p:cNvSpPr txBox="1"/>
-          <p:nvPr/>
-        </p:nvSpPr>
-        <p:spPr>
-          <a:xfrm>
-            <a:off x="548884" y="576425"/>
-            <a:ext cx="1381404" cy="369332"/>
-          </a:xfrm>
-          <a:prstGeom prst="rect">
-            <a:avLst/>
-          </a:prstGeom>
-          <a:noFill/>
-        </p:spPr>
-        <p:txBody>
-          <a:bodyPr wrap="none" rtlCol="0">
-            <a:spAutoFit/>
-          </a:bodyPr>
-          <a:lstStyle/>
-          <a:p>
-            <a:r>
-              <a:rPr lang="en-US" dirty="0">
+            <a:off x="489359" y="498511"/>
+            <a:ext cx="10264781" cy="5838484"/>
+            <a:chOff x="489359" y="498511"/>
+            <a:chExt cx="10264781" cy="5838484"/>
+          </a:xfrm>
+        </p:grpSpPr>
+        <p:sp>
+          <p:nvSpPr>
+            <p:cNvPr id="2" name="TextBox 1">
+              <a:extLst>
+                <a:ext uri="{FF2B5EF4-FFF2-40B4-BE49-F238E27FC236}">
+                  <a16:creationId xmlns:a16="http://schemas.microsoft.com/office/drawing/2014/main" id="{265E7B79-E624-4D75-A00B-FFAE1AE76551}"/>
+                </a:ext>
+              </a:extLst>
+            </p:cNvPr>
+            <p:cNvSpPr txBox="1"/>
+            <p:nvPr/>
+          </p:nvSpPr>
+          <p:spPr>
+            <a:xfrm>
+              <a:off x="565484" y="5173579"/>
+              <a:ext cx="1490601" cy="369332"/>
+            </a:xfrm>
+            <a:prstGeom prst="rect">
+              <a:avLst/>
+            </a:prstGeom>
+            <a:noFill/>
+          </p:spPr>
+          <p:txBody>
+            <a:bodyPr wrap="none" rtlCol="0">
+              <a:spAutoFit/>
+            </a:bodyPr>
+            <a:lstStyle/>
+            <a:p>
+              <a:r>
+                <a:rPr lang="en-US" dirty="0">
+                  <a:solidFill>
+                    <a:schemeClr val="accent1"/>
+                  </a:solidFill>
+                </a:rPr>
+                <a:t>OCI  Elements</a:t>
+              </a:r>
+            </a:p>
+          </p:txBody>
+        </p:sp>
+        <p:sp>
+          <p:nvSpPr>
+            <p:cNvPr id="3" name="TextBox 2">
+              <a:extLst>
+                <a:ext uri="{FF2B5EF4-FFF2-40B4-BE49-F238E27FC236}">
+                  <a16:creationId xmlns:a16="http://schemas.microsoft.com/office/drawing/2014/main" id="{72BDB7C9-CC2B-41C6-9842-DFFA4A81A501}"/>
+                </a:ext>
+              </a:extLst>
+            </p:cNvPr>
+            <p:cNvSpPr txBox="1"/>
+            <p:nvPr/>
+          </p:nvSpPr>
+          <p:spPr>
+            <a:xfrm>
+              <a:off x="4734074" y="5563321"/>
+              <a:ext cx="1692451" cy="369332"/>
+            </a:xfrm>
+            <a:prstGeom prst="rect">
+              <a:avLst/>
+            </a:prstGeom>
+            <a:noFill/>
+          </p:spPr>
+          <p:txBody>
+            <a:bodyPr wrap="none" rtlCol="0">
+              <a:spAutoFit/>
+            </a:bodyPr>
+            <a:lstStyle/>
+            <a:p>
+              <a:r>
+                <a:rPr lang="en-US" dirty="0" err="1">
+                  <a:solidFill>
+                    <a:schemeClr val="accent1"/>
+                  </a:solidFill>
+                </a:rPr>
+                <a:t>ImageManifest</a:t>
+              </a:r>
+              <a:r>
+                <a:rPr lang="en-US" dirty="0">
+                  <a:solidFill>
+                    <a:schemeClr val="accent1"/>
+                  </a:solidFill>
+                </a:rPr>
+                <a:t> </a:t>
+              </a:r>
+            </a:p>
+          </p:txBody>
+        </p:sp>
+        <p:sp>
+          <p:nvSpPr>
+            <p:cNvPr id="4" name="TextBox 3">
+              <a:extLst>
+                <a:ext uri="{FF2B5EF4-FFF2-40B4-BE49-F238E27FC236}">
+                  <a16:creationId xmlns:a16="http://schemas.microsoft.com/office/drawing/2014/main" id="{18F994F1-F8AC-4B0B-A052-B71D19355A9C}"/>
+                </a:ext>
+              </a:extLst>
+            </p:cNvPr>
+            <p:cNvSpPr txBox="1"/>
+            <p:nvPr/>
+          </p:nvSpPr>
+          <p:spPr>
+            <a:xfrm>
+              <a:off x="7635011" y="5562238"/>
+              <a:ext cx="1577098" cy="369332"/>
+            </a:xfrm>
+            <a:prstGeom prst="rect">
+              <a:avLst/>
+            </a:prstGeom>
+            <a:noFill/>
+          </p:spPr>
+          <p:txBody>
+            <a:bodyPr wrap="none" rtlCol="0">
+              <a:spAutoFit/>
+            </a:bodyPr>
+            <a:lstStyle/>
+            <a:p>
+              <a:r>
+                <a:rPr lang="en-US" dirty="0" err="1">
+                  <a:solidFill>
+                    <a:schemeClr val="accent1"/>
+                  </a:solidFill>
+                </a:rPr>
+                <a:t>IndexManifest</a:t>
+              </a:r>
+              <a:r>
+                <a:rPr lang="en-US" dirty="0">
+                  <a:solidFill>
+                    <a:schemeClr val="accent1"/>
+                  </a:solidFill>
+                </a:rPr>
+                <a:t> </a:t>
+              </a:r>
+            </a:p>
+          </p:txBody>
+        </p:sp>
+        <p:sp>
+          <p:nvSpPr>
+            <p:cNvPr id="5" name="TextBox 4">
+              <a:extLst>
+                <a:ext uri="{FF2B5EF4-FFF2-40B4-BE49-F238E27FC236}">
+                  <a16:creationId xmlns:a16="http://schemas.microsoft.com/office/drawing/2014/main" id="{9B334D95-57C2-4D52-9BF5-62B042F809E2}"/>
+                </a:ext>
+              </a:extLst>
+            </p:cNvPr>
+            <p:cNvSpPr txBox="1"/>
+            <p:nvPr/>
+          </p:nvSpPr>
+          <p:spPr>
+            <a:xfrm>
+              <a:off x="4093258" y="5967663"/>
+              <a:ext cx="685701" cy="369332"/>
+            </a:xfrm>
+            <a:prstGeom prst="rect">
+              <a:avLst/>
+            </a:prstGeom>
+            <a:noFill/>
+          </p:spPr>
+          <p:txBody>
+            <a:bodyPr wrap="none" rtlCol="0">
+              <a:spAutoFit/>
+            </a:bodyPr>
+            <a:lstStyle/>
+            <a:p>
+              <a:r>
+                <a:rPr lang="en-US" dirty="0">
+                  <a:solidFill>
+                    <a:schemeClr val="accent1"/>
+                  </a:solidFill>
+                </a:rPr>
+                <a:t>Layer</a:t>
+              </a:r>
+            </a:p>
+          </p:txBody>
+        </p:sp>
+        <p:sp>
+          <p:nvSpPr>
+            <p:cNvPr id="6" name="TextBox 5">
+              <a:extLst>
+                <a:ext uri="{FF2B5EF4-FFF2-40B4-BE49-F238E27FC236}">
+                  <a16:creationId xmlns:a16="http://schemas.microsoft.com/office/drawing/2014/main" id="{C8BB9A7A-A29D-442C-8893-06BF1A29BF0A}"/>
+                </a:ext>
+              </a:extLst>
+            </p:cNvPr>
+            <p:cNvSpPr txBox="1"/>
+            <p:nvPr/>
+          </p:nvSpPr>
+          <p:spPr>
+            <a:xfrm>
+              <a:off x="5833826" y="5943600"/>
+              <a:ext cx="782843" cy="369332"/>
+            </a:xfrm>
+            <a:prstGeom prst="rect">
+              <a:avLst/>
+            </a:prstGeom>
+            <a:noFill/>
+          </p:spPr>
+          <p:txBody>
+            <a:bodyPr wrap="none" rtlCol="0">
+              <a:spAutoFit/>
+            </a:bodyPr>
+            <a:lstStyle/>
+            <a:p>
+              <a:r>
+                <a:rPr lang="en-US" dirty="0">
+                  <a:solidFill>
+                    <a:schemeClr val="accent1"/>
+                  </a:solidFill>
+                </a:rPr>
+                <a:t>Config</a:t>
+              </a:r>
+            </a:p>
+          </p:txBody>
+        </p:sp>
+        <p:sp>
+          <p:nvSpPr>
+            <p:cNvPr id="7" name="TextBox 6">
+              <a:extLst>
+                <a:ext uri="{FF2B5EF4-FFF2-40B4-BE49-F238E27FC236}">
+                  <a16:creationId xmlns:a16="http://schemas.microsoft.com/office/drawing/2014/main" id="{1122DB26-D9A6-4FAD-B270-2200DD7F9A2E}"/>
+                </a:ext>
+              </a:extLst>
+            </p:cNvPr>
+            <p:cNvSpPr txBox="1"/>
+            <p:nvPr/>
+          </p:nvSpPr>
+          <p:spPr>
+            <a:xfrm>
+              <a:off x="6957971" y="5967663"/>
+              <a:ext cx="1702646" cy="369332"/>
+            </a:xfrm>
+            <a:prstGeom prst="rect">
+              <a:avLst/>
+            </a:prstGeom>
+            <a:noFill/>
+          </p:spPr>
+          <p:txBody>
+            <a:bodyPr wrap="none" rtlCol="0">
+              <a:spAutoFit/>
+            </a:bodyPr>
+            <a:lstStyle/>
+            <a:p>
+              <a:r>
+                <a:rPr lang="en-US" dirty="0">
+                  <a:solidFill>
+                    <a:schemeClr val="accent1"/>
+                  </a:solidFill>
+                </a:rPr>
+                <a:t>Blob(descriptor)</a:t>
+              </a:r>
+            </a:p>
+          </p:txBody>
+        </p:sp>
+        <p:sp>
+          <p:nvSpPr>
+            <p:cNvPr id="8" name="TextBox 7">
+              <a:extLst>
+                <a:ext uri="{FF2B5EF4-FFF2-40B4-BE49-F238E27FC236}">
+                  <a16:creationId xmlns:a16="http://schemas.microsoft.com/office/drawing/2014/main" id="{1BF88E12-8DF0-47E1-8CEA-848703151515}"/>
+                </a:ext>
+              </a:extLst>
+            </p:cNvPr>
+            <p:cNvSpPr txBox="1"/>
+            <p:nvPr/>
+          </p:nvSpPr>
+          <p:spPr>
+            <a:xfrm>
+              <a:off x="548884" y="576425"/>
+              <a:ext cx="1577163" cy="369332"/>
+            </a:xfrm>
+            <a:prstGeom prst="rect">
+              <a:avLst/>
+            </a:prstGeom>
+            <a:noFill/>
+          </p:spPr>
+          <p:txBody>
+            <a:bodyPr wrap="none" rtlCol="0">
+              <a:spAutoFit/>
+            </a:bodyPr>
+            <a:lstStyle/>
+            <a:p>
+              <a:r>
+                <a:rPr lang="en-US" dirty="0">
+                  <a:solidFill>
+                    <a:schemeClr val="accent6"/>
+                  </a:solidFill>
+                </a:rPr>
+                <a:t>OCM Elements</a:t>
+              </a:r>
+            </a:p>
+          </p:txBody>
+        </p:sp>
+        <p:sp>
+          <p:nvSpPr>
+            <p:cNvPr id="9" name="TextBox 8">
+              <a:extLst>
+                <a:ext uri="{FF2B5EF4-FFF2-40B4-BE49-F238E27FC236}">
+                  <a16:creationId xmlns:a16="http://schemas.microsoft.com/office/drawing/2014/main" id="{69C7BC09-8344-4404-A588-EB134DE7AFF5}"/>
+                </a:ext>
+              </a:extLst>
+            </p:cNvPr>
+            <p:cNvSpPr txBox="1"/>
+            <p:nvPr/>
+          </p:nvSpPr>
+          <p:spPr>
+            <a:xfrm>
+              <a:off x="2315564" y="498511"/>
+              <a:ext cx="1989712" cy="369332"/>
+            </a:xfrm>
+            <a:prstGeom prst="rect">
+              <a:avLst/>
+            </a:prstGeom>
+            <a:noFill/>
+          </p:spPr>
+          <p:txBody>
+            <a:bodyPr wrap="none" rtlCol="0">
+              <a:spAutoFit/>
+            </a:bodyPr>
+            <a:lstStyle/>
+            <a:p>
+              <a:r>
+                <a:rPr lang="en-US" dirty="0" err="1">
+                  <a:solidFill>
+                    <a:schemeClr val="accent6"/>
+                  </a:solidFill>
+                </a:rPr>
+                <a:t>ComponentVersion</a:t>
+              </a:r>
+              <a:endParaRPr lang="en-US" dirty="0">
                 <a:solidFill>
                   <a:schemeClr val="accent6"/>
                 </a:solidFill>
-              </a:rPr>
-              <a:t>OCM Layer 1</a:t>
-            </a:r>
-          </a:p>
-        </p:txBody>
-      </p:sp>
-      <p:sp>
-        <p:nvSpPr>
-          <p:cNvPr id="9" name="TextBox 8">
-            <a:extLst>
-              <a:ext uri="{FF2B5EF4-FFF2-40B4-BE49-F238E27FC236}">
-                <a16:creationId xmlns:a16="http://schemas.microsoft.com/office/drawing/2014/main" id="{69C7BC09-8344-4404-A588-EB134DE7AFF5}"/>
-              </a:ext>
-            </a:extLst>
-          </p:cNvPr>
-          <p:cNvSpPr txBox="1"/>
-          <p:nvPr/>
-        </p:nvSpPr>
-        <p:spPr>
-          <a:xfrm>
-            <a:off x="2315564" y="498511"/>
-            <a:ext cx="1989712" cy="369332"/>
-          </a:xfrm>
-          <a:prstGeom prst="rect">
-            <a:avLst/>
-          </a:prstGeom>
-          <a:noFill/>
-        </p:spPr>
-        <p:txBody>
-          <a:bodyPr wrap="none" rtlCol="0">
-            <a:spAutoFit/>
-          </a:bodyPr>
-          <a:lstStyle/>
-          <a:p>
-            <a:r>
-              <a:rPr lang="en-US" dirty="0" err="1">
+              </a:endParaRPr>
+            </a:p>
+          </p:txBody>
+        </p:sp>
+        <p:sp>
+          <p:nvSpPr>
+            <p:cNvPr id="10" name="TextBox 9">
+              <a:extLst>
+                <a:ext uri="{FF2B5EF4-FFF2-40B4-BE49-F238E27FC236}">
+                  <a16:creationId xmlns:a16="http://schemas.microsoft.com/office/drawing/2014/main" id="{286A01AA-7C99-4813-9414-39798B1C9239}"/>
+                </a:ext>
+              </a:extLst>
+            </p:cNvPr>
+            <p:cNvSpPr txBox="1"/>
+            <p:nvPr/>
+          </p:nvSpPr>
+          <p:spPr>
+            <a:xfrm>
+              <a:off x="3724522" y="951298"/>
+              <a:ext cx="2267993" cy="369332"/>
+            </a:xfrm>
+            <a:prstGeom prst="rect">
+              <a:avLst/>
+            </a:prstGeom>
+            <a:noFill/>
+          </p:spPr>
+          <p:txBody>
+            <a:bodyPr wrap="none" rtlCol="0">
+              <a:spAutoFit/>
+            </a:bodyPr>
+            <a:lstStyle/>
+            <a:p>
+              <a:r>
+                <a:rPr lang="en-US" dirty="0" err="1">
+                  <a:solidFill>
+                    <a:schemeClr val="accent6"/>
+                  </a:solidFill>
+                </a:rPr>
+                <a:t>ComponentDescriptor</a:t>
+              </a:r>
+              <a:endParaRPr lang="en-US" dirty="0">
                 <a:solidFill>
                   <a:schemeClr val="accent6"/>
                 </a:solidFill>
-              </a:rPr>
-              <a:t>ComponentVersion</a:t>
-            </a:r>
-            <a:endParaRPr lang="en-US" dirty="0">
+              </a:endParaRPr>
+            </a:p>
+          </p:txBody>
+        </p:sp>
+        <p:sp>
+          <p:nvSpPr>
+            <p:cNvPr id="11" name="TextBox 10">
+              <a:extLst>
+                <a:ext uri="{FF2B5EF4-FFF2-40B4-BE49-F238E27FC236}">
+                  <a16:creationId xmlns:a16="http://schemas.microsoft.com/office/drawing/2014/main" id="{8D4D232F-0A15-424A-B1A8-DB392F71F973}"/>
+                </a:ext>
+              </a:extLst>
+            </p:cNvPr>
+            <p:cNvSpPr txBox="1"/>
+            <p:nvPr/>
+          </p:nvSpPr>
+          <p:spPr>
+            <a:xfrm>
+              <a:off x="6535131" y="1147398"/>
+              <a:ext cx="1085233" cy="646331"/>
+            </a:xfrm>
+            <a:prstGeom prst="rect">
+              <a:avLst/>
+            </a:prstGeom>
+            <a:noFill/>
+          </p:spPr>
+          <p:txBody>
+            <a:bodyPr wrap="none" rtlCol="0">
+              <a:spAutoFit/>
+            </a:bodyPr>
+            <a:lstStyle/>
+            <a:p>
+              <a:r>
+                <a:rPr lang="en-US" dirty="0" err="1">
+                  <a:solidFill>
+                    <a:schemeClr val="accent6"/>
+                  </a:solidFill>
+                </a:rPr>
+                <a:t>LocalBlob</a:t>
+              </a:r>
+              <a:endParaRPr lang="en-US" dirty="0">
+                <a:solidFill>
+                  <a:schemeClr val="accent6"/>
+                </a:solidFill>
+              </a:endParaRPr>
+            </a:p>
+            <a:p>
+              <a:r>
+                <a:rPr lang="en-US" dirty="0">
+                  <a:solidFill>
+                    <a:schemeClr val="accent6"/>
+                  </a:solidFill>
+                </a:rPr>
+                <a:t>- Identity</a:t>
+              </a:r>
+            </a:p>
+          </p:txBody>
+        </p:sp>
+        <p:sp>
+          <p:nvSpPr>
+            <p:cNvPr id="12" name="TextBox 11">
+              <a:extLst>
+                <a:ext uri="{FF2B5EF4-FFF2-40B4-BE49-F238E27FC236}">
+                  <a16:creationId xmlns:a16="http://schemas.microsoft.com/office/drawing/2014/main" id="{6305AFF6-D635-46C9-92A0-48778243F38E}"/>
+                </a:ext>
+              </a:extLst>
+            </p:cNvPr>
+            <p:cNvSpPr txBox="1"/>
+            <p:nvPr/>
+          </p:nvSpPr>
+          <p:spPr>
+            <a:xfrm>
+              <a:off x="5368410" y="3166863"/>
+              <a:ext cx="1586653" cy="369332"/>
+            </a:xfrm>
+            <a:prstGeom prst="rect">
+              <a:avLst/>
+            </a:prstGeom>
+            <a:noFill/>
+          </p:spPr>
+          <p:txBody>
+            <a:bodyPr wrap="none" rtlCol="0">
+              <a:spAutoFit/>
+            </a:bodyPr>
+            <a:lstStyle/>
+            <a:p>
+              <a:r>
+                <a:rPr lang="en-US" dirty="0" err="1"/>
+                <a:t>ImageManifest</a:t>
+              </a:r>
+              <a:endParaRPr lang="en-US" dirty="0"/>
+            </a:p>
+          </p:txBody>
+        </p:sp>
+        <p:sp>
+          <p:nvSpPr>
+            <p:cNvPr id="13" name="TextBox 12">
+              <a:extLst>
+                <a:ext uri="{FF2B5EF4-FFF2-40B4-BE49-F238E27FC236}">
+                  <a16:creationId xmlns:a16="http://schemas.microsoft.com/office/drawing/2014/main" id="{B5799D74-609F-498D-8C10-3BA56BF55E02}"/>
+                </a:ext>
+              </a:extLst>
+            </p:cNvPr>
+            <p:cNvSpPr txBox="1"/>
+            <p:nvPr/>
+          </p:nvSpPr>
+          <p:spPr>
+            <a:xfrm>
+              <a:off x="3895015" y="5354818"/>
+              <a:ext cx="498470" cy="369332"/>
+            </a:xfrm>
+            <a:prstGeom prst="rect">
+              <a:avLst/>
+            </a:prstGeom>
+            <a:noFill/>
+          </p:spPr>
+          <p:txBody>
+            <a:bodyPr wrap="none" rtlCol="0">
+              <a:spAutoFit/>
+            </a:bodyPr>
+            <a:lstStyle/>
+            <a:p>
+              <a:r>
+                <a:rPr lang="en-US" dirty="0">
+                  <a:solidFill>
+                    <a:schemeClr val="accent1"/>
+                  </a:solidFill>
+                </a:rPr>
+                <a:t>Tag</a:t>
+              </a:r>
+            </a:p>
+          </p:txBody>
+        </p:sp>
+        <p:sp>
+          <p:nvSpPr>
+            <p:cNvPr id="14" name="TextBox 13">
+              <a:extLst>
+                <a:ext uri="{FF2B5EF4-FFF2-40B4-BE49-F238E27FC236}">
+                  <a16:creationId xmlns:a16="http://schemas.microsoft.com/office/drawing/2014/main" id="{E0353E75-668E-461A-95D8-B35B0A8B6A1F}"/>
+                </a:ext>
+              </a:extLst>
+            </p:cNvPr>
+            <p:cNvSpPr txBox="1"/>
+            <p:nvPr/>
+          </p:nvSpPr>
+          <p:spPr>
+            <a:xfrm>
+              <a:off x="3889035" y="3548771"/>
+              <a:ext cx="498470" cy="369332"/>
+            </a:xfrm>
+            <a:prstGeom prst="rect">
+              <a:avLst/>
+            </a:prstGeom>
+            <a:noFill/>
+          </p:spPr>
+          <p:txBody>
+            <a:bodyPr wrap="none" rtlCol="0">
+              <a:spAutoFit/>
+            </a:bodyPr>
+            <a:lstStyle/>
+            <a:p>
+              <a:r>
+                <a:rPr lang="en-US" dirty="0"/>
+                <a:t>Tag</a:t>
+              </a:r>
+            </a:p>
+          </p:txBody>
+        </p:sp>
+        <p:cxnSp>
+          <p:nvCxnSpPr>
+            <p:cNvPr id="16" name="Connector: Elbow 15">
+              <a:extLst>
+                <a:ext uri="{FF2B5EF4-FFF2-40B4-BE49-F238E27FC236}">
+                  <a16:creationId xmlns:a16="http://schemas.microsoft.com/office/drawing/2014/main" id="{EE67B0A4-066E-4F6C-8ED3-95BEB6A3ECFC}"/>
+                </a:ext>
+              </a:extLst>
+            </p:cNvPr>
+            <p:cNvCxnSpPr>
+              <a:stCxn id="9" idx="2"/>
+              <a:endCxn id="14" idx="1"/>
+            </p:cNvCxnSpPr>
+            <p:nvPr/>
+          </p:nvCxnSpPr>
+          <p:spPr>
+            <a:xfrm rot="16200000" flipH="1">
+              <a:off x="2166930" y="2011332"/>
+              <a:ext cx="2865594" cy="578615"/>
+            </a:xfrm>
+            <a:prstGeom prst="bentConnector2">
+              <a:avLst/>
+            </a:prstGeom>
+            <a:ln w="12700">
+              <a:solidFill>
+                <a:schemeClr val="bg2">
+                  <a:lumMod val="75000"/>
+                </a:schemeClr>
+              </a:solidFill>
+              <a:tailEnd type="triangle"/>
+            </a:ln>
+          </p:spPr>
+          <p:style>
+            <a:lnRef idx="1">
+              <a:schemeClr val="accent1"/>
+            </a:lnRef>
+            <a:fillRef idx="0">
+              <a:schemeClr val="accent1"/>
+            </a:fillRef>
+            <a:effectRef idx="0">
+              <a:schemeClr val="accent1"/>
+            </a:effectRef>
+            <a:fontRef idx="minor">
+              <a:schemeClr val="tx1"/>
+            </a:fontRef>
+          </p:style>
+        </p:cxnSp>
+        <p:sp>
+          <p:nvSpPr>
+            <p:cNvPr id="17" name="TextBox 16">
+              <a:extLst>
+                <a:ext uri="{FF2B5EF4-FFF2-40B4-BE49-F238E27FC236}">
+                  <a16:creationId xmlns:a16="http://schemas.microsoft.com/office/drawing/2014/main" id="{C21B45B5-A4B4-439D-9F1F-376888086619}"/>
+                </a:ext>
+              </a:extLst>
+            </p:cNvPr>
+            <p:cNvSpPr txBox="1"/>
+            <p:nvPr/>
+          </p:nvSpPr>
+          <p:spPr>
+            <a:xfrm>
+              <a:off x="3242097" y="3653170"/>
+              <a:ext cx="715260" cy="307777"/>
+            </a:xfrm>
+            <a:prstGeom prst="rect">
+              <a:avLst/>
+            </a:prstGeom>
+            <a:noFill/>
+          </p:spPr>
+          <p:txBody>
+            <a:bodyPr wrap="none" rtlCol="0">
+              <a:spAutoFit/>
+            </a:bodyPr>
+            <a:lstStyle/>
+            <a:p>
+              <a:r>
+                <a:rPr lang="en-US" sz="1400" dirty="0"/>
+                <a:t>version</a:t>
+              </a:r>
+            </a:p>
+          </p:txBody>
+        </p:sp>
+        <p:cxnSp>
+          <p:nvCxnSpPr>
+            <p:cNvPr id="19" name="Connector: Elbow 18">
+              <a:extLst>
+                <a:ext uri="{FF2B5EF4-FFF2-40B4-BE49-F238E27FC236}">
+                  <a16:creationId xmlns:a16="http://schemas.microsoft.com/office/drawing/2014/main" id="{1BCDAAA4-74C8-468F-8CF5-71C48B53F772}"/>
+                </a:ext>
+              </a:extLst>
+            </p:cNvPr>
+            <p:cNvCxnSpPr>
+              <a:cxnSpLocks/>
+              <a:stCxn id="9" idx="2"/>
+              <a:endCxn id="12" idx="1"/>
+            </p:cNvCxnSpPr>
+            <p:nvPr/>
+          </p:nvCxnSpPr>
+          <p:spPr>
+            <a:xfrm rot="16200000" flipH="1">
+              <a:off x="3097572" y="1080691"/>
+              <a:ext cx="2483686" cy="2057990"/>
+            </a:xfrm>
+            <a:prstGeom prst="bentConnector2">
+              <a:avLst/>
+            </a:prstGeom>
+            <a:ln w="12700">
+              <a:solidFill>
+                <a:schemeClr val="bg2">
+                  <a:lumMod val="75000"/>
+                </a:schemeClr>
+              </a:solidFill>
+              <a:tailEnd type="triangle"/>
+            </a:ln>
+          </p:spPr>
+          <p:style>
+            <a:lnRef idx="1">
+              <a:schemeClr val="accent1"/>
+            </a:lnRef>
+            <a:fillRef idx="0">
+              <a:schemeClr val="accent1"/>
+            </a:fillRef>
+            <a:effectRef idx="0">
+              <a:schemeClr val="accent1"/>
+            </a:effectRef>
+            <a:fontRef idx="minor">
+              <a:schemeClr val="tx1"/>
+            </a:fontRef>
+          </p:style>
+        </p:cxnSp>
+        <p:sp>
+          <p:nvSpPr>
+            <p:cNvPr id="23" name="TextBox 22">
+              <a:extLst>
+                <a:ext uri="{FF2B5EF4-FFF2-40B4-BE49-F238E27FC236}">
+                  <a16:creationId xmlns:a16="http://schemas.microsoft.com/office/drawing/2014/main" id="{8B4A0B74-E8FB-4976-AB28-6FE33828A05A}"/>
+                </a:ext>
+              </a:extLst>
+            </p:cNvPr>
+            <p:cNvSpPr txBox="1"/>
+            <p:nvPr/>
+          </p:nvSpPr>
+          <p:spPr>
+            <a:xfrm>
+              <a:off x="7233326" y="3941621"/>
+              <a:ext cx="1144544" cy="369332"/>
+            </a:xfrm>
+            <a:prstGeom prst="rect">
+              <a:avLst/>
+            </a:prstGeom>
+            <a:noFill/>
+          </p:spPr>
+          <p:txBody>
+            <a:bodyPr wrap="none" rtlCol="0">
+              <a:spAutoFit/>
+            </a:bodyPr>
+            <a:lstStyle/>
+            <a:p>
+              <a:r>
+                <a:rPr lang="en-US" dirty="0"/>
+                <a:t>Layer (tar)</a:t>
+              </a:r>
+            </a:p>
+          </p:txBody>
+        </p:sp>
+        <p:cxnSp>
+          <p:nvCxnSpPr>
+            <p:cNvPr id="27" name="Connector: Elbow 26">
+              <a:extLst>
+                <a:ext uri="{FF2B5EF4-FFF2-40B4-BE49-F238E27FC236}">
+                  <a16:creationId xmlns:a16="http://schemas.microsoft.com/office/drawing/2014/main" id="{D8BEC7A8-D35E-41EE-8E53-9D92937E3F98}"/>
+                </a:ext>
+              </a:extLst>
+            </p:cNvPr>
+            <p:cNvCxnSpPr>
+              <a:stCxn id="10" idx="2"/>
+              <a:endCxn id="23" idx="0"/>
+            </p:cNvCxnSpPr>
+            <p:nvPr/>
+          </p:nvCxnSpPr>
+          <p:spPr>
+            <a:xfrm rot="16200000" flipH="1">
+              <a:off x="5021563" y="1157585"/>
+              <a:ext cx="2620991" cy="2947079"/>
+            </a:xfrm>
+            <a:prstGeom prst="bentConnector3">
+              <a:avLst>
+                <a:gd name="adj1" fmla="val 37492"/>
+              </a:avLst>
+            </a:prstGeom>
+            <a:ln w="12700">
+              <a:solidFill>
+                <a:schemeClr val="bg2">
+                  <a:lumMod val="75000"/>
+                </a:schemeClr>
+              </a:solidFill>
+              <a:tailEnd type="triangle"/>
+            </a:ln>
+          </p:spPr>
+          <p:style>
+            <a:lnRef idx="1">
+              <a:schemeClr val="accent1"/>
+            </a:lnRef>
+            <a:fillRef idx="0">
+              <a:schemeClr val="accent1"/>
+            </a:fillRef>
+            <a:effectRef idx="0">
+              <a:schemeClr val="accent1"/>
+            </a:effectRef>
+            <a:fontRef idx="minor">
+              <a:schemeClr val="tx1"/>
+            </a:fontRef>
+          </p:style>
+        </p:cxnSp>
+        <p:cxnSp>
+          <p:nvCxnSpPr>
+            <p:cNvPr id="29" name="Connector: Elbow 28">
+              <a:extLst>
+                <a:ext uri="{FF2B5EF4-FFF2-40B4-BE49-F238E27FC236}">
+                  <a16:creationId xmlns:a16="http://schemas.microsoft.com/office/drawing/2014/main" id="{B5DA1C01-16E9-40A7-9DAE-F6D9DBE78A05}"/>
+                </a:ext>
+              </a:extLst>
+            </p:cNvPr>
+            <p:cNvCxnSpPr>
+              <a:stCxn id="12" idx="2"/>
+              <a:endCxn id="23" idx="1"/>
+            </p:cNvCxnSpPr>
+            <p:nvPr/>
+          </p:nvCxnSpPr>
+          <p:spPr>
+            <a:xfrm rot="16200000" flipH="1">
+              <a:off x="6402485" y="3295446"/>
+              <a:ext cx="590092" cy="1071589"/>
+            </a:xfrm>
+            <a:prstGeom prst="bentConnector2">
+              <a:avLst/>
+            </a:prstGeom>
+            <a:ln>
+              <a:solidFill>
+                <a:schemeClr val="accent1"/>
+              </a:solidFill>
+              <a:prstDash val="sysDot"/>
+              <a:tailEnd type="triangle"/>
+            </a:ln>
+          </p:spPr>
+          <p:style>
+            <a:lnRef idx="1">
+              <a:schemeClr val="accent1"/>
+            </a:lnRef>
+            <a:fillRef idx="0">
+              <a:schemeClr val="accent1"/>
+            </a:fillRef>
+            <a:effectRef idx="0">
+              <a:schemeClr val="accent1"/>
+            </a:effectRef>
+            <a:fontRef idx="minor">
+              <a:schemeClr val="tx1"/>
+            </a:fontRef>
+          </p:style>
+        </p:cxnSp>
+        <p:cxnSp>
+          <p:nvCxnSpPr>
+            <p:cNvPr id="31" name="Connector: Elbow 30">
+              <a:extLst>
+                <a:ext uri="{FF2B5EF4-FFF2-40B4-BE49-F238E27FC236}">
+                  <a16:creationId xmlns:a16="http://schemas.microsoft.com/office/drawing/2014/main" id="{F19DC5F3-7A23-4EBE-B81D-D41684862FBD}"/>
+                </a:ext>
+              </a:extLst>
+            </p:cNvPr>
+            <p:cNvCxnSpPr>
+              <a:stCxn id="14" idx="3"/>
+              <a:endCxn id="12" idx="1"/>
+            </p:cNvCxnSpPr>
+            <p:nvPr/>
+          </p:nvCxnSpPr>
+          <p:spPr>
+            <a:xfrm flipV="1">
+              <a:off x="4387505" y="3351529"/>
+              <a:ext cx="980905" cy="381908"/>
+            </a:xfrm>
+            <a:prstGeom prst="bentConnector3">
+              <a:avLst/>
+            </a:prstGeom>
+            <a:ln>
+              <a:solidFill>
+                <a:schemeClr val="accent1"/>
+              </a:solidFill>
+              <a:prstDash val="sysDot"/>
+              <a:tailEnd type="triangle"/>
+            </a:ln>
+          </p:spPr>
+          <p:style>
+            <a:lnRef idx="1">
+              <a:schemeClr val="accent1"/>
+            </a:lnRef>
+            <a:fillRef idx="0">
+              <a:schemeClr val="accent1"/>
+            </a:fillRef>
+            <a:effectRef idx="0">
+              <a:schemeClr val="accent1"/>
+            </a:effectRef>
+            <a:fontRef idx="minor">
+              <a:schemeClr val="tx1"/>
+            </a:fontRef>
+          </p:style>
+        </p:cxnSp>
+        <p:sp>
+          <p:nvSpPr>
+            <p:cNvPr id="34" name="TextBox 33">
+              <a:extLst>
+                <a:ext uri="{FF2B5EF4-FFF2-40B4-BE49-F238E27FC236}">
+                  <a16:creationId xmlns:a16="http://schemas.microsoft.com/office/drawing/2014/main" id="{E37933D0-2E41-4FE7-A1B2-DC856479E7AD}"/>
+                </a:ext>
+              </a:extLst>
+            </p:cNvPr>
+            <p:cNvSpPr txBox="1"/>
+            <p:nvPr/>
+          </p:nvSpPr>
+          <p:spPr>
+            <a:xfrm>
+              <a:off x="8423560" y="3179439"/>
+              <a:ext cx="782843" cy="369332"/>
+            </a:xfrm>
+            <a:prstGeom prst="rect">
+              <a:avLst/>
+            </a:prstGeom>
+            <a:noFill/>
+          </p:spPr>
+          <p:txBody>
+            <a:bodyPr wrap="none" rtlCol="0">
+              <a:spAutoFit/>
+            </a:bodyPr>
+            <a:lstStyle/>
+            <a:p>
+              <a:r>
+                <a:rPr lang="en-US" dirty="0"/>
+                <a:t>Config</a:t>
+              </a:r>
+            </a:p>
+          </p:txBody>
+        </p:sp>
+        <p:cxnSp>
+          <p:nvCxnSpPr>
+            <p:cNvPr id="35" name="Connector: Elbow 34">
+              <a:extLst>
+                <a:ext uri="{FF2B5EF4-FFF2-40B4-BE49-F238E27FC236}">
+                  <a16:creationId xmlns:a16="http://schemas.microsoft.com/office/drawing/2014/main" id="{547998C0-9969-4DFF-8906-109CD6C1E2C1}"/>
+                </a:ext>
+              </a:extLst>
+            </p:cNvPr>
+            <p:cNvCxnSpPr>
+              <a:cxnSpLocks/>
+              <a:stCxn id="12" idx="3"/>
+              <a:endCxn id="34" idx="1"/>
+            </p:cNvCxnSpPr>
+            <p:nvPr/>
+          </p:nvCxnSpPr>
+          <p:spPr>
+            <a:xfrm>
+              <a:off x="6955063" y="3351529"/>
+              <a:ext cx="1468497" cy="12576"/>
+            </a:xfrm>
+            <a:prstGeom prst="bentConnector3">
+              <a:avLst>
+                <a:gd name="adj1" fmla="val 50000"/>
+              </a:avLst>
+            </a:prstGeom>
+            <a:ln>
+              <a:prstDash val="sysDot"/>
+              <a:tailEnd type="triangle"/>
+            </a:ln>
+          </p:spPr>
+          <p:style>
+            <a:lnRef idx="1">
+              <a:schemeClr val="accent1"/>
+            </a:lnRef>
+            <a:fillRef idx="0">
+              <a:schemeClr val="accent1"/>
+            </a:fillRef>
+            <a:effectRef idx="0">
+              <a:schemeClr val="accent1"/>
+            </a:effectRef>
+            <a:fontRef idx="minor">
+              <a:schemeClr val="tx1"/>
+            </a:fontRef>
+          </p:style>
+        </p:cxnSp>
+        <p:sp>
+          <p:nvSpPr>
+            <p:cNvPr id="40" name="TextBox 39">
+              <a:extLst>
+                <a:ext uri="{FF2B5EF4-FFF2-40B4-BE49-F238E27FC236}">
+                  <a16:creationId xmlns:a16="http://schemas.microsoft.com/office/drawing/2014/main" id="{BAC3E68F-82E2-4A63-B911-388755EC754F}"/>
+                </a:ext>
+              </a:extLst>
+            </p:cNvPr>
+            <p:cNvSpPr txBox="1"/>
+            <p:nvPr/>
+          </p:nvSpPr>
+          <p:spPr>
+            <a:xfrm>
+              <a:off x="9051494" y="3918103"/>
+              <a:ext cx="1702646" cy="369332"/>
+            </a:xfrm>
+            <a:prstGeom prst="rect">
+              <a:avLst/>
+            </a:prstGeom>
+            <a:noFill/>
+          </p:spPr>
+          <p:txBody>
+            <a:bodyPr wrap="none" rtlCol="0">
+              <a:spAutoFit/>
+            </a:bodyPr>
+            <a:lstStyle/>
+            <a:p>
+              <a:r>
+                <a:rPr lang="en-US" dirty="0"/>
+                <a:t>Blob(descriptor)</a:t>
+              </a:r>
+            </a:p>
+          </p:txBody>
+        </p:sp>
+        <p:cxnSp>
+          <p:nvCxnSpPr>
+            <p:cNvPr id="42" name="Connector: Elbow 41">
+              <a:extLst>
+                <a:ext uri="{FF2B5EF4-FFF2-40B4-BE49-F238E27FC236}">
+                  <a16:creationId xmlns:a16="http://schemas.microsoft.com/office/drawing/2014/main" id="{D43DB1CF-B2EC-4765-85EA-068FE060800E}"/>
+                </a:ext>
+              </a:extLst>
+            </p:cNvPr>
+            <p:cNvCxnSpPr>
+              <a:cxnSpLocks/>
+              <a:stCxn id="10" idx="2"/>
+              <a:endCxn id="40" idx="0"/>
+            </p:cNvCxnSpPr>
+            <p:nvPr/>
+          </p:nvCxnSpPr>
+          <p:spPr>
+            <a:xfrm rot="16200000" flipH="1">
+              <a:off x="6081932" y="97217"/>
+              <a:ext cx="2597473" cy="5044298"/>
+            </a:xfrm>
+            <a:prstGeom prst="bentConnector3">
+              <a:avLst>
+                <a:gd name="adj1" fmla="val 35657"/>
+              </a:avLst>
+            </a:prstGeom>
+            <a:ln w="12700">
+              <a:solidFill>
+                <a:schemeClr val="bg2">
+                  <a:lumMod val="75000"/>
+                </a:schemeClr>
+              </a:solidFill>
+              <a:tailEnd type="triangle"/>
+            </a:ln>
+          </p:spPr>
+          <p:style>
+            <a:lnRef idx="1">
+              <a:schemeClr val="accent1"/>
+            </a:lnRef>
+            <a:fillRef idx="0">
+              <a:schemeClr val="accent1"/>
+            </a:fillRef>
+            <a:effectRef idx="0">
+              <a:schemeClr val="accent1"/>
+            </a:effectRef>
+            <a:fontRef idx="minor">
+              <a:schemeClr val="tx1"/>
+            </a:fontRef>
+          </p:style>
+        </p:cxnSp>
+        <p:cxnSp>
+          <p:nvCxnSpPr>
+            <p:cNvPr id="45" name="Connector: Elbow 44">
+              <a:extLst>
+                <a:ext uri="{FF2B5EF4-FFF2-40B4-BE49-F238E27FC236}">
+                  <a16:creationId xmlns:a16="http://schemas.microsoft.com/office/drawing/2014/main" id="{04957AB3-7251-46B3-B38D-9234D825F044}"/>
+                </a:ext>
+              </a:extLst>
+            </p:cNvPr>
+            <p:cNvCxnSpPr>
+              <a:stCxn id="10" idx="2"/>
+              <a:endCxn id="34" idx="0"/>
+            </p:cNvCxnSpPr>
+            <p:nvPr/>
+          </p:nvCxnSpPr>
+          <p:spPr>
+            <a:xfrm rot="16200000" flipH="1">
+              <a:off x="5907346" y="271802"/>
+              <a:ext cx="1858809" cy="3956463"/>
+            </a:xfrm>
+            <a:prstGeom prst="bentConnector3">
+              <a:avLst>
+                <a:gd name="adj1" fmla="val 51468"/>
+              </a:avLst>
+            </a:prstGeom>
+            <a:ln w="12700">
+              <a:solidFill>
+                <a:schemeClr val="bg2">
+                  <a:lumMod val="75000"/>
+                </a:schemeClr>
+              </a:solidFill>
+              <a:tailEnd type="triangle"/>
+            </a:ln>
+          </p:spPr>
+          <p:style>
+            <a:lnRef idx="1">
+              <a:schemeClr val="accent1"/>
+            </a:lnRef>
+            <a:fillRef idx="0">
+              <a:schemeClr val="accent1"/>
+            </a:fillRef>
+            <a:effectRef idx="0">
+              <a:schemeClr val="accent1"/>
+            </a:effectRef>
+            <a:fontRef idx="minor">
+              <a:schemeClr val="tx1"/>
+            </a:fontRef>
+          </p:style>
+        </p:cxnSp>
+        <p:cxnSp>
+          <p:nvCxnSpPr>
+            <p:cNvPr id="47" name="Connector: Elbow 46">
+              <a:extLst>
+                <a:ext uri="{FF2B5EF4-FFF2-40B4-BE49-F238E27FC236}">
+                  <a16:creationId xmlns:a16="http://schemas.microsoft.com/office/drawing/2014/main" id="{4E067498-6D84-4BDD-AAD0-FB8F52672945}"/>
+                </a:ext>
+              </a:extLst>
+            </p:cNvPr>
+            <p:cNvCxnSpPr>
+              <a:stCxn id="34" idx="2"/>
+              <a:endCxn id="40" idx="1"/>
+            </p:cNvCxnSpPr>
+            <p:nvPr/>
+          </p:nvCxnSpPr>
+          <p:spPr>
+            <a:xfrm rot="16200000" flipH="1">
+              <a:off x="8656239" y="3707514"/>
+              <a:ext cx="553998" cy="236512"/>
+            </a:xfrm>
+            <a:prstGeom prst="bentConnector2">
+              <a:avLst/>
+            </a:prstGeom>
+            <a:ln>
+              <a:solidFill>
+                <a:schemeClr val="accent1"/>
+              </a:solidFill>
+              <a:prstDash val="sysDot"/>
+              <a:tailEnd type="triangle"/>
+            </a:ln>
+          </p:spPr>
+          <p:style>
+            <a:lnRef idx="1">
+              <a:schemeClr val="accent1"/>
+            </a:lnRef>
+            <a:fillRef idx="0">
+              <a:schemeClr val="accent1"/>
+            </a:fillRef>
+            <a:effectRef idx="0">
+              <a:schemeClr val="accent1"/>
+            </a:effectRef>
+            <a:fontRef idx="minor">
+              <a:schemeClr val="tx1"/>
+            </a:fontRef>
+          </p:style>
+        </p:cxnSp>
+        <p:cxnSp>
+          <p:nvCxnSpPr>
+            <p:cNvPr id="55" name="Connector: Elbow 54">
+              <a:extLst>
+                <a:ext uri="{FF2B5EF4-FFF2-40B4-BE49-F238E27FC236}">
+                  <a16:creationId xmlns:a16="http://schemas.microsoft.com/office/drawing/2014/main" id="{E988BB19-9A5B-44B1-8E62-61E85656A341}"/>
+                </a:ext>
+              </a:extLst>
+            </p:cNvPr>
+            <p:cNvCxnSpPr>
+              <a:stCxn id="10" idx="3"/>
+              <a:endCxn id="11" idx="1"/>
+            </p:cNvCxnSpPr>
+            <p:nvPr/>
+          </p:nvCxnSpPr>
+          <p:spPr>
+            <a:xfrm>
+              <a:off x="5992515" y="1135964"/>
+              <a:ext cx="542616" cy="334600"/>
+            </a:xfrm>
+            <a:prstGeom prst="bentConnector3">
+              <a:avLst/>
+            </a:prstGeom>
+            <a:ln>
               <a:solidFill>
                 <a:schemeClr val="accent6"/>
               </a:solidFill>
-            </a:endParaRPr>
-          </a:p>
-        </p:txBody>
-      </p:sp>
-      <p:sp>
-        <p:nvSpPr>
-          <p:cNvPr id="10" name="TextBox 9">
-            <a:extLst>
-              <a:ext uri="{FF2B5EF4-FFF2-40B4-BE49-F238E27FC236}">
-                <a16:creationId xmlns:a16="http://schemas.microsoft.com/office/drawing/2014/main" id="{286A01AA-7C99-4813-9414-39798B1C9239}"/>
-              </a:ext>
-            </a:extLst>
-          </p:cNvPr>
-          <p:cNvSpPr txBox="1"/>
-          <p:nvPr/>
-        </p:nvSpPr>
-        <p:spPr>
-          <a:xfrm>
-            <a:off x="3724522" y="951298"/>
-            <a:ext cx="2267993" cy="369332"/>
-          </a:xfrm>
-          <a:prstGeom prst="rect">
-            <a:avLst/>
-          </a:prstGeom>
-          <a:noFill/>
-        </p:spPr>
-        <p:txBody>
-          <a:bodyPr wrap="none" rtlCol="0">
-            <a:spAutoFit/>
-          </a:bodyPr>
-          <a:lstStyle/>
-          <a:p>
-            <a:r>
-              <a:rPr lang="en-US" dirty="0" err="1">
-                <a:solidFill>
-                  <a:schemeClr val="accent6"/>
-                </a:solidFill>
-              </a:rPr>
-              <a:t>ComponentDescriptor</a:t>
-            </a:r>
-            <a:endParaRPr lang="en-US" dirty="0">
+              <a:tailEnd type="triangle"/>
+            </a:ln>
+          </p:spPr>
+          <p:style>
+            <a:lnRef idx="1">
+              <a:schemeClr val="accent1"/>
+            </a:lnRef>
+            <a:fillRef idx="0">
+              <a:schemeClr val="accent1"/>
+            </a:fillRef>
+            <a:effectRef idx="0">
+              <a:schemeClr val="accent1"/>
+            </a:effectRef>
+            <a:fontRef idx="minor">
+              <a:schemeClr val="tx1"/>
+            </a:fontRef>
+          </p:style>
+        </p:cxnSp>
+        <p:cxnSp>
+          <p:nvCxnSpPr>
+            <p:cNvPr id="57" name="Connector: Elbow 56">
+              <a:extLst>
+                <a:ext uri="{FF2B5EF4-FFF2-40B4-BE49-F238E27FC236}">
+                  <a16:creationId xmlns:a16="http://schemas.microsoft.com/office/drawing/2014/main" id="{0D1DF802-9A33-4BE7-98F0-1719BCA5F63E}"/>
+                </a:ext>
+              </a:extLst>
+            </p:cNvPr>
+            <p:cNvCxnSpPr>
+              <a:cxnSpLocks/>
+              <a:stCxn id="11" idx="2"/>
+              <a:endCxn id="58" idx="1"/>
+            </p:cNvCxnSpPr>
+            <p:nvPr/>
+          </p:nvCxnSpPr>
+          <p:spPr>
+            <a:xfrm rot="16200000" flipH="1">
+              <a:off x="5787569" y="3083908"/>
+              <a:ext cx="2773534" cy="193176"/>
+            </a:xfrm>
+            <a:prstGeom prst="bentConnector2">
+              <a:avLst/>
+            </a:prstGeom>
+            <a:ln w="12700">
+              <a:solidFill>
+                <a:schemeClr val="bg2">
+                  <a:lumMod val="75000"/>
+                </a:schemeClr>
+              </a:solidFill>
+              <a:tailEnd type="triangle"/>
+            </a:ln>
+          </p:spPr>
+          <p:style>
+            <a:lnRef idx="1">
+              <a:schemeClr val="accent1"/>
+            </a:lnRef>
+            <a:fillRef idx="0">
+              <a:schemeClr val="accent1"/>
+            </a:fillRef>
+            <a:effectRef idx="0">
+              <a:schemeClr val="accent1"/>
+            </a:effectRef>
+            <a:fontRef idx="minor">
+              <a:schemeClr val="tx1"/>
+            </a:fontRef>
+          </p:style>
+        </p:cxnSp>
+        <p:sp>
+          <p:nvSpPr>
+            <p:cNvPr id="58" name="TextBox 57">
+              <a:extLst>
+                <a:ext uri="{FF2B5EF4-FFF2-40B4-BE49-F238E27FC236}">
+                  <a16:creationId xmlns:a16="http://schemas.microsoft.com/office/drawing/2014/main" id="{9CFA9F83-334D-4705-AEFF-1056FF1D3051}"/>
+                </a:ext>
+              </a:extLst>
+            </p:cNvPr>
+            <p:cNvSpPr txBox="1"/>
+            <p:nvPr/>
+          </p:nvSpPr>
+          <p:spPr>
+            <a:xfrm>
+              <a:off x="7270924" y="4382597"/>
+              <a:ext cx="1298048" cy="369332"/>
+            </a:xfrm>
+            <a:prstGeom prst="rect">
+              <a:avLst/>
+            </a:prstGeom>
+            <a:noFill/>
+          </p:spPr>
+          <p:txBody>
+            <a:bodyPr wrap="none" rtlCol="0">
+              <a:spAutoFit/>
+            </a:bodyPr>
+            <a:lstStyle/>
+            <a:p>
+              <a:r>
+                <a:rPr lang="en-US" dirty="0"/>
+                <a:t>Layer (blob)</a:t>
+              </a:r>
+            </a:p>
+          </p:txBody>
+        </p:sp>
+        <p:sp>
+          <p:nvSpPr>
+            <p:cNvPr id="71" name="TextBox 70">
+              <a:extLst>
+                <a:ext uri="{FF2B5EF4-FFF2-40B4-BE49-F238E27FC236}">
+                  <a16:creationId xmlns:a16="http://schemas.microsoft.com/office/drawing/2014/main" id="{3AD2FC1F-9C62-409C-9208-B35E4D808CE3}"/>
+                </a:ext>
+              </a:extLst>
+            </p:cNvPr>
+            <p:cNvSpPr txBox="1"/>
+            <p:nvPr/>
+          </p:nvSpPr>
+          <p:spPr>
+            <a:xfrm rot="16200000">
+              <a:off x="6696069" y="3569679"/>
+              <a:ext cx="558358" cy="276999"/>
+            </a:xfrm>
+            <a:prstGeom prst="rect">
+              <a:avLst/>
+            </a:prstGeom>
+            <a:noFill/>
+          </p:spPr>
+          <p:txBody>
+            <a:bodyPr wrap="none" rtlCol="0">
+              <a:spAutoFit/>
+            </a:bodyPr>
+            <a:lstStyle/>
+            <a:p>
+              <a:r>
+                <a:rPr lang="en-US" sz="1200" dirty="0"/>
+                <a:t>digest</a:t>
+              </a:r>
+            </a:p>
+          </p:txBody>
+        </p:sp>
+        <p:cxnSp>
+          <p:nvCxnSpPr>
+            <p:cNvPr id="72" name="Connector: Elbow 71">
+              <a:extLst>
+                <a:ext uri="{FF2B5EF4-FFF2-40B4-BE49-F238E27FC236}">
+                  <a16:creationId xmlns:a16="http://schemas.microsoft.com/office/drawing/2014/main" id="{B65291E1-1553-4C09-9A35-672B55834668}"/>
+                </a:ext>
+              </a:extLst>
+            </p:cNvPr>
+            <p:cNvCxnSpPr>
+              <a:cxnSpLocks/>
+              <a:stCxn id="9" idx="2"/>
+              <a:endCxn id="10" idx="1"/>
+            </p:cNvCxnSpPr>
+            <p:nvPr/>
+          </p:nvCxnSpPr>
+          <p:spPr>
+            <a:xfrm rot="16200000" flipH="1">
+              <a:off x="3383411" y="794852"/>
+              <a:ext cx="268121" cy="414102"/>
+            </a:xfrm>
+            <a:prstGeom prst="bentConnector2">
+              <a:avLst/>
+            </a:prstGeom>
+            <a:ln>
               <a:solidFill>
                 <a:schemeClr val="accent6"/>
               </a:solidFill>
-            </a:endParaRPr>
-          </a:p>
-        </p:txBody>
-      </p:sp>
-      <p:sp>
-        <p:nvSpPr>
-          <p:cNvPr id="11" name="TextBox 10">
-            <a:extLst>
-              <a:ext uri="{FF2B5EF4-FFF2-40B4-BE49-F238E27FC236}">
-                <a16:creationId xmlns:a16="http://schemas.microsoft.com/office/drawing/2014/main" id="{8D4D232F-0A15-424A-B1A8-DB392F71F973}"/>
-              </a:ext>
-            </a:extLst>
-          </p:cNvPr>
-          <p:cNvSpPr txBox="1"/>
-          <p:nvPr/>
-        </p:nvSpPr>
-        <p:spPr>
-          <a:xfrm>
-            <a:off x="6535131" y="1147398"/>
-            <a:ext cx="1085233" cy="646331"/>
-          </a:xfrm>
-          <a:prstGeom prst="rect">
-            <a:avLst/>
-          </a:prstGeom>
-          <a:noFill/>
-        </p:spPr>
-        <p:txBody>
-          <a:bodyPr wrap="none" rtlCol="0">
-            <a:spAutoFit/>
-          </a:bodyPr>
-          <a:lstStyle/>
-          <a:p>
-            <a:r>
-              <a:rPr lang="en-US" dirty="0" err="1">
-                <a:solidFill>
-                  <a:schemeClr val="accent6"/>
-                </a:solidFill>
-              </a:rPr>
-              <a:t>LocalBlob</a:t>
-            </a:r>
-            <a:endParaRPr lang="en-US" dirty="0">
+              <a:tailEnd type="triangle"/>
+            </a:ln>
+          </p:spPr>
+          <p:style>
+            <a:lnRef idx="1">
+              <a:schemeClr val="accent1"/>
+            </a:lnRef>
+            <a:fillRef idx="0">
+              <a:schemeClr val="accent1"/>
+            </a:fillRef>
+            <a:effectRef idx="0">
+              <a:schemeClr val="accent1"/>
+            </a:effectRef>
+            <a:fontRef idx="minor">
+              <a:schemeClr val="tx1"/>
+            </a:fontRef>
+          </p:style>
+        </p:cxnSp>
+        <p:cxnSp>
+          <p:nvCxnSpPr>
+            <p:cNvPr id="84" name="Connector: Elbow 83">
+              <a:extLst>
+                <a:ext uri="{FF2B5EF4-FFF2-40B4-BE49-F238E27FC236}">
+                  <a16:creationId xmlns:a16="http://schemas.microsoft.com/office/drawing/2014/main" id="{B0D740BA-22F7-46A4-AE0B-D5E58BA40DD7}"/>
+                </a:ext>
+              </a:extLst>
+            </p:cNvPr>
+            <p:cNvCxnSpPr>
+              <a:cxnSpLocks/>
+              <a:stCxn id="12" idx="2"/>
+              <a:endCxn id="58" idx="1"/>
+            </p:cNvCxnSpPr>
+            <p:nvPr/>
+          </p:nvCxnSpPr>
+          <p:spPr>
+            <a:xfrm rot="16200000" flipH="1">
+              <a:off x="6200796" y="3497135"/>
+              <a:ext cx="1031068" cy="1109187"/>
+            </a:xfrm>
+            <a:prstGeom prst="bentConnector2">
+              <a:avLst/>
+            </a:prstGeom>
+            <a:ln>
               <a:solidFill>
-                <a:schemeClr val="accent6"/>
+                <a:schemeClr val="accent1"/>
               </a:solidFill>
-            </a:endParaRPr>
-          </a:p>
-          <a:p>
-            <a:r>
-              <a:rPr lang="en-US" dirty="0">
-                <a:solidFill>
-                  <a:schemeClr val="accent6"/>
-                </a:solidFill>
-              </a:rPr>
-              <a:t>- Identity</a:t>
-            </a:r>
-          </a:p>
-        </p:txBody>
-      </p:sp>
-      <p:sp>
-        <p:nvSpPr>
-          <p:cNvPr id="12" name="TextBox 11">
-            <a:extLst>
-              <a:ext uri="{FF2B5EF4-FFF2-40B4-BE49-F238E27FC236}">
-                <a16:creationId xmlns:a16="http://schemas.microsoft.com/office/drawing/2014/main" id="{6305AFF6-D635-46C9-92A0-48778243F38E}"/>
-              </a:ext>
-            </a:extLst>
-          </p:cNvPr>
-          <p:cNvSpPr txBox="1"/>
-          <p:nvPr/>
-        </p:nvSpPr>
-        <p:spPr>
-          <a:xfrm>
-            <a:off x="5368410" y="3166863"/>
-            <a:ext cx="1586653" cy="369332"/>
-          </a:xfrm>
-          <a:prstGeom prst="rect">
-            <a:avLst/>
-          </a:prstGeom>
-          <a:noFill/>
-        </p:spPr>
-        <p:txBody>
-          <a:bodyPr wrap="none" rtlCol="0">
-            <a:spAutoFit/>
-          </a:bodyPr>
-          <a:lstStyle/>
-          <a:p>
-            <a:r>
-              <a:rPr lang="en-US" dirty="0" err="1"/>
-              <a:t>ImageManifest</a:t>
-            </a:r>
-            <a:endParaRPr lang="en-US" dirty="0"/>
-          </a:p>
-        </p:txBody>
-      </p:sp>
-      <p:sp>
-        <p:nvSpPr>
-          <p:cNvPr id="13" name="TextBox 12">
-            <a:extLst>
-              <a:ext uri="{FF2B5EF4-FFF2-40B4-BE49-F238E27FC236}">
-                <a16:creationId xmlns:a16="http://schemas.microsoft.com/office/drawing/2014/main" id="{B5799D74-609F-498D-8C10-3BA56BF55E02}"/>
-              </a:ext>
-            </a:extLst>
-          </p:cNvPr>
-          <p:cNvSpPr txBox="1"/>
-          <p:nvPr/>
-        </p:nvSpPr>
-        <p:spPr>
-          <a:xfrm>
-            <a:off x="3047141" y="5354818"/>
-            <a:ext cx="498470" cy="369332"/>
-          </a:xfrm>
-          <a:prstGeom prst="rect">
-            <a:avLst/>
-          </a:prstGeom>
-          <a:noFill/>
-        </p:spPr>
-        <p:txBody>
-          <a:bodyPr wrap="none" rtlCol="0">
-            <a:spAutoFit/>
-          </a:bodyPr>
-          <a:lstStyle/>
-          <a:p>
-            <a:r>
-              <a:rPr lang="en-US" dirty="0">
-                <a:solidFill>
-                  <a:schemeClr val="accent1"/>
-                </a:solidFill>
-              </a:rPr>
-              <a:t>Tag</a:t>
-            </a:r>
-          </a:p>
-        </p:txBody>
-      </p:sp>
-      <p:sp>
-        <p:nvSpPr>
-          <p:cNvPr id="14" name="TextBox 13">
-            <a:extLst>
-              <a:ext uri="{FF2B5EF4-FFF2-40B4-BE49-F238E27FC236}">
-                <a16:creationId xmlns:a16="http://schemas.microsoft.com/office/drawing/2014/main" id="{E0353E75-668E-461A-95D8-B35B0A8B6A1F}"/>
-              </a:ext>
-            </a:extLst>
-          </p:cNvPr>
-          <p:cNvSpPr txBox="1"/>
-          <p:nvPr/>
-        </p:nvSpPr>
-        <p:spPr>
-          <a:xfrm>
-            <a:off x="3889035" y="3548771"/>
-            <a:ext cx="498470" cy="369332"/>
-          </a:xfrm>
-          <a:prstGeom prst="rect">
-            <a:avLst/>
-          </a:prstGeom>
-          <a:noFill/>
-        </p:spPr>
-        <p:txBody>
-          <a:bodyPr wrap="none" rtlCol="0">
-            <a:spAutoFit/>
-          </a:bodyPr>
-          <a:lstStyle/>
-          <a:p>
-            <a:r>
-              <a:rPr lang="en-US" dirty="0"/>
-              <a:t>Tag</a:t>
-            </a:r>
-          </a:p>
-        </p:txBody>
-      </p:sp>
-      <p:cxnSp>
-        <p:nvCxnSpPr>
-          <p:cNvPr id="16" name="Connector: Elbow 15">
-            <a:extLst>
-              <a:ext uri="{FF2B5EF4-FFF2-40B4-BE49-F238E27FC236}">
-                <a16:creationId xmlns:a16="http://schemas.microsoft.com/office/drawing/2014/main" id="{EE67B0A4-066E-4F6C-8ED3-95BEB6A3ECFC}"/>
-              </a:ext>
-            </a:extLst>
-          </p:cNvPr>
-          <p:cNvCxnSpPr>
-            <a:stCxn id="9" idx="2"/>
-            <a:endCxn id="14" idx="1"/>
-          </p:cNvCxnSpPr>
-          <p:nvPr/>
-        </p:nvCxnSpPr>
-        <p:spPr>
-          <a:xfrm rot="16200000" flipH="1">
-            <a:off x="2166930" y="2011332"/>
-            <a:ext cx="2865594" cy="578615"/>
-          </a:xfrm>
-          <a:prstGeom prst="bentConnector2">
-            <a:avLst/>
-          </a:prstGeom>
-          <a:ln w="12700">
+              <a:prstDash val="sysDot"/>
+              <a:tailEnd type="triangle"/>
+            </a:ln>
+          </p:spPr>
+          <p:style>
+            <a:lnRef idx="1">
+              <a:schemeClr val="accent1"/>
+            </a:lnRef>
+            <a:fillRef idx="0">
+              <a:schemeClr val="accent1"/>
+            </a:fillRef>
+            <a:effectRef idx="0">
+              <a:schemeClr val="accent1"/>
+            </a:effectRef>
+            <a:fontRef idx="minor">
+              <a:schemeClr val="tx1"/>
+            </a:fontRef>
+          </p:style>
+        </p:cxnSp>
+        <p:sp>
+          <p:nvSpPr>
+            <p:cNvPr id="87" name="Arrow: Down 86">
+              <a:extLst>
+                <a:ext uri="{FF2B5EF4-FFF2-40B4-BE49-F238E27FC236}">
+                  <a16:creationId xmlns:a16="http://schemas.microsoft.com/office/drawing/2014/main" id="{70EF0D0A-C0C8-4BB0-95E1-A3D98C62D114}"/>
+                </a:ext>
+              </a:extLst>
+            </p:cNvPr>
+            <p:cNvSpPr/>
+            <p:nvPr/>
+          </p:nvSpPr>
+          <p:spPr>
+            <a:xfrm>
+              <a:off x="1024147" y="1749592"/>
+              <a:ext cx="772858" cy="3221037"/>
+            </a:xfrm>
+            <a:prstGeom prst="downArrow">
+              <a:avLst/>
+            </a:prstGeom>
             <a:solidFill>
               <a:schemeClr val="bg2">
                 <a:lumMod val="75000"/>
               </a:schemeClr>
             </a:solidFill>
-            <a:tailEnd type="triangle"/>
-          </a:ln>
-        </p:spPr>
-        <p:style>
-          <a:lnRef idx="1">
-            <a:schemeClr val="accent1"/>
-          </a:lnRef>
-          <a:fillRef idx="0">
-            <a:schemeClr val="accent1"/>
-          </a:fillRef>
-          <a:effectRef idx="0">
-            <a:schemeClr val="accent1"/>
-          </a:effectRef>
-          <a:fontRef idx="minor">
-            <a:schemeClr val="tx1"/>
-          </a:fontRef>
-        </p:style>
-      </p:cxnSp>
-      <p:sp>
-        <p:nvSpPr>
-          <p:cNvPr id="17" name="TextBox 16">
-            <a:extLst>
-              <a:ext uri="{FF2B5EF4-FFF2-40B4-BE49-F238E27FC236}">
-                <a16:creationId xmlns:a16="http://schemas.microsoft.com/office/drawing/2014/main" id="{C21B45B5-A4B4-439D-9F1F-376888086619}"/>
-              </a:ext>
-            </a:extLst>
-          </p:cNvPr>
-          <p:cNvSpPr txBox="1"/>
-          <p:nvPr/>
-        </p:nvSpPr>
-        <p:spPr>
-          <a:xfrm>
-            <a:off x="3242097" y="3653170"/>
-            <a:ext cx="715260" cy="307777"/>
-          </a:xfrm>
-          <a:prstGeom prst="rect">
-            <a:avLst/>
-          </a:prstGeom>
-          <a:noFill/>
-        </p:spPr>
-        <p:txBody>
-          <a:bodyPr wrap="none" rtlCol="0">
-            <a:spAutoFit/>
-          </a:bodyPr>
-          <a:lstStyle/>
-          <a:p>
-            <a:r>
-              <a:rPr lang="en-US" sz="1400" dirty="0"/>
-              <a:t>version</a:t>
-            </a:r>
-          </a:p>
-        </p:txBody>
-      </p:sp>
-      <p:cxnSp>
-        <p:nvCxnSpPr>
-          <p:cNvPr id="19" name="Connector: Elbow 18">
-            <a:extLst>
-              <a:ext uri="{FF2B5EF4-FFF2-40B4-BE49-F238E27FC236}">
-                <a16:creationId xmlns:a16="http://schemas.microsoft.com/office/drawing/2014/main" id="{1BCDAAA4-74C8-468F-8CF5-71C48B53F772}"/>
-              </a:ext>
-            </a:extLst>
-          </p:cNvPr>
-          <p:cNvCxnSpPr>
-            <a:cxnSpLocks/>
-            <a:stCxn id="9" idx="2"/>
-            <a:endCxn id="12" idx="1"/>
-          </p:cNvCxnSpPr>
-          <p:nvPr/>
-        </p:nvCxnSpPr>
-        <p:spPr>
-          <a:xfrm rot="16200000" flipH="1">
-            <a:off x="3097572" y="1080691"/>
-            <a:ext cx="2483686" cy="2057990"/>
-          </a:xfrm>
-          <a:prstGeom prst="bentConnector2">
-            <a:avLst/>
-          </a:prstGeom>
-          <a:ln w="12700">
-            <a:solidFill>
-              <a:schemeClr val="bg2">
-                <a:lumMod val="75000"/>
+            <a:ln>
+              <a:noFill/>
+            </a:ln>
+          </p:spPr>
+          <p:style>
+            <a:lnRef idx="2">
+              <a:schemeClr val="accent1">
+                <a:shade val="50000"/>
               </a:schemeClr>
-            </a:solidFill>
-            <a:tailEnd type="triangle"/>
-          </a:ln>
-        </p:spPr>
-        <p:style>
-          <a:lnRef idx="1">
-            <a:schemeClr val="accent1"/>
-          </a:lnRef>
-          <a:fillRef idx="0">
-            <a:schemeClr val="accent1"/>
-          </a:fillRef>
-          <a:effectRef idx="0">
-            <a:schemeClr val="accent1"/>
-          </a:effectRef>
-          <a:fontRef idx="minor">
-            <a:schemeClr val="tx1"/>
-          </a:fontRef>
-        </p:style>
-      </p:cxnSp>
-      <p:sp>
-        <p:nvSpPr>
-          <p:cNvPr id="23" name="TextBox 22">
-            <a:extLst>
-              <a:ext uri="{FF2B5EF4-FFF2-40B4-BE49-F238E27FC236}">
-                <a16:creationId xmlns:a16="http://schemas.microsoft.com/office/drawing/2014/main" id="{8B4A0B74-E8FB-4976-AB28-6FE33828A05A}"/>
-              </a:ext>
-            </a:extLst>
-          </p:cNvPr>
-          <p:cNvSpPr txBox="1"/>
-          <p:nvPr/>
-        </p:nvSpPr>
-        <p:spPr>
-          <a:xfrm>
-            <a:off x="7233326" y="3941621"/>
-            <a:ext cx="1144544" cy="369332"/>
-          </a:xfrm>
-          <a:prstGeom prst="rect">
-            <a:avLst/>
-          </a:prstGeom>
-          <a:noFill/>
-        </p:spPr>
-        <p:txBody>
-          <a:bodyPr wrap="none" rtlCol="0">
-            <a:spAutoFit/>
-          </a:bodyPr>
-          <a:lstStyle/>
-          <a:p>
-            <a:r>
-              <a:rPr lang="en-US" dirty="0"/>
-              <a:t>Layer (tar)</a:t>
-            </a:r>
-          </a:p>
-        </p:txBody>
-      </p:sp>
-      <p:cxnSp>
-        <p:nvCxnSpPr>
-          <p:cNvPr id="27" name="Connector: Elbow 26">
-            <a:extLst>
-              <a:ext uri="{FF2B5EF4-FFF2-40B4-BE49-F238E27FC236}">
-                <a16:creationId xmlns:a16="http://schemas.microsoft.com/office/drawing/2014/main" id="{D8BEC7A8-D35E-41EE-8E53-9D92937E3F98}"/>
-              </a:ext>
-            </a:extLst>
-          </p:cNvPr>
-          <p:cNvCxnSpPr>
-            <a:stCxn id="10" idx="2"/>
-            <a:endCxn id="23" idx="0"/>
-          </p:cNvCxnSpPr>
-          <p:nvPr/>
-        </p:nvCxnSpPr>
-        <p:spPr>
-          <a:xfrm rot="16200000" flipH="1">
-            <a:off x="5021563" y="1157585"/>
-            <a:ext cx="2620991" cy="2947079"/>
-          </a:xfrm>
-          <a:prstGeom prst="bentConnector3">
-            <a:avLst>
-              <a:gd name="adj1" fmla="val 37492"/>
-            </a:avLst>
-          </a:prstGeom>
-          <a:ln w="12700">
-            <a:solidFill>
-              <a:schemeClr val="bg2">
-                <a:lumMod val="75000"/>
-              </a:schemeClr>
-            </a:solidFill>
-            <a:tailEnd type="triangle"/>
-          </a:ln>
-        </p:spPr>
-        <p:style>
-          <a:lnRef idx="1">
-            <a:schemeClr val="accent1"/>
-          </a:lnRef>
-          <a:fillRef idx="0">
-            <a:schemeClr val="accent1"/>
-          </a:fillRef>
-          <a:effectRef idx="0">
-            <a:schemeClr val="accent1"/>
-          </a:effectRef>
-          <a:fontRef idx="minor">
-            <a:schemeClr val="tx1"/>
-          </a:fontRef>
-        </p:style>
-      </p:cxnSp>
-      <p:cxnSp>
-        <p:nvCxnSpPr>
-          <p:cNvPr id="29" name="Connector: Elbow 28">
-            <a:extLst>
-              <a:ext uri="{FF2B5EF4-FFF2-40B4-BE49-F238E27FC236}">
-                <a16:creationId xmlns:a16="http://schemas.microsoft.com/office/drawing/2014/main" id="{B5DA1C01-16E9-40A7-9DAE-F6D9DBE78A05}"/>
-              </a:ext>
-            </a:extLst>
-          </p:cNvPr>
-          <p:cNvCxnSpPr>
-            <a:stCxn id="12" idx="2"/>
-            <a:endCxn id="23" idx="1"/>
-          </p:cNvCxnSpPr>
-          <p:nvPr/>
-        </p:nvCxnSpPr>
-        <p:spPr>
-          <a:xfrm rot="16200000" flipH="1">
-            <a:off x="6402485" y="3295446"/>
-            <a:ext cx="590092" cy="1071589"/>
-          </a:xfrm>
-          <a:prstGeom prst="bentConnector2">
-            <a:avLst/>
-          </a:prstGeom>
-          <a:ln>
-            <a:solidFill>
+            </a:lnRef>
+            <a:fillRef idx="1">
               <a:schemeClr val="accent1"/>
-            </a:solidFill>
-            <a:prstDash val="sysDot"/>
-            <a:tailEnd type="triangle"/>
-          </a:ln>
-        </p:spPr>
-        <p:style>
-          <a:lnRef idx="1">
-            <a:schemeClr val="accent1"/>
-          </a:lnRef>
-          <a:fillRef idx="0">
-            <a:schemeClr val="accent1"/>
-          </a:fillRef>
-          <a:effectRef idx="0">
-            <a:schemeClr val="accent1"/>
-          </a:effectRef>
-          <a:fontRef idx="minor">
-            <a:schemeClr val="tx1"/>
-          </a:fontRef>
-        </p:style>
-      </p:cxnSp>
-      <p:cxnSp>
-        <p:nvCxnSpPr>
-          <p:cNvPr id="31" name="Connector: Elbow 30">
-            <a:extLst>
-              <a:ext uri="{FF2B5EF4-FFF2-40B4-BE49-F238E27FC236}">
-                <a16:creationId xmlns:a16="http://schemas.microsoft.com/office/drawing/2014/main" id="{F19DC5F3-7A23-4EBE-B81D-D41684862FBD}"/>
-              </a:ext>
-            </a:extLst>
-          </p:cNvPr>
-          <p:cNvCxnSpPr>
-            <a:stCxn id="14" idx="3"/>
-            <a:endCxn id="12" idx="1"/>
-          </p:cNvCxnSpPr>
-          <p:nvPr/>
-        </p:nvCxnSpPr>
-        <p:spPr>
-          <a:xfrm flipV="1">
-            <a:off x="4387505" y="3351529"/>
-            <a:ext cx="980905" cy="381908"/>
-          </a:xfrm>
-          <a:prstGeom prst="bentConnector3">
-            <a:avLst/>
-          </a:prstGeom>
-          <a:ln>
-            <a:solidFill>
+            </a:fillRef>
+            <a:effectRef idx="0">
               <a:schemeClr val="accent1"/>
-            </a:solidFill>
-            <a:prstDash val="sysDot"/>
-            <a:tailEnd type="triangle"/>
-          </a:ln>
-        </p:spPr>
-        <p:style>
-          <a:lnRef idx="1">
-            <a:schemeClr val="accent1"/>
-          </a:lnRef>
-          <a:fillRef idx="0">
-            <a:schemeClr val="accent1"/>
-          </a:fillRef>
-          <a:effectRef idx="0">
-            <a:schemeClr val="accent1"/>
-          </a:effectRef>
-          <a:fontRef idx="minor">
-            <a:schemeClr val="tx1"/>
-          </a:fontRef>
-        </p:style>
-      </p:cxnSp>
-      <p:sp>
-        <p:nvSpPr>
-          <p:cNvPr id="34" name="TextBox 33">
-            <a:extLst>
-              <a:ext uri="{FF2B5EF4-FFF2-40B4-BE49-F238E27FC236}">
-                <a16:creationId xmlns:a16="http://schemas.microsoft.com/office/drawing/2014/main" id="{E37933D0-2E41-4FE7-A1B2-DC856479E7AD}"/>
-              </a:ext>
-            </a:extLst>
-          </p:cNvPr>
-          <p:cNvSpPr txBox="1"/>
-          <p:nvPr/>
-        </p:nvSpPr>
-        <p:spPr>
-          <a:xfrm>
-            <a:off x="8423560" y="3179439"/>
-            <a:ext cx="782843" cy="369332"/>
-          </a:xfrm>
-          <a:prstGeom prst="rect">
-            <a:avLst/>
-          </a:prstGeom>
-          <a:noFill/>
-        </p:spPr>
-        <p:txBody>
-          <a:bodyPr wrap="none" rtlCol="0">
-            <a:spAutoFit/>
-          </a:bodyPr>
-          <a:lstStyle/>
-          <a:p>
-            <a:r>
-              <a:rPr lang="en-US" dirty="0"/>
-              <a:t>Config</a:t>
-            </a:r>
-          </a:p>
-        </p:txBody>
-      </p:sp>
-      <p:cxnSp>
-        <p:nvCxnSpPr>
-          <p:cNvPr id="35" name="Connector: Elbow 34">
-            <a:extLst>
-              <a:ext uri="{FF2B5EF4-FFF2-40B4-BE49-F238E27FC236}">
-                <a16:creationId xmlns:a16="http://schemas.microsoft.com/office/drawing/2014/main" id="{547998C0-9969-4DFF-8906-109CD6C1E2C1}"/>
-              </a:ext>
-            </a:extLst>
-          </p:cNvPr>
-          <p:cNvCxnSpPr>
-            <a:cxnSpLocks/>
-            <a:stCxn id="12" idx="3"/>
-            <a:endCxn id="34" idx="1"/>
-          </p:cNvCxnSpPr>
-          <p:nvPr/>
-        </p:nvCxnSpPr>
-        <p:spPr>
-          <a:xfrm>
-            <a:off x="6955063" y="3351529"/>
-            <a:ext cx="1468497" cy="12576"/>
-          </a:xfrm>
-          <a:prstGeom prst="bentConnector3">
-            <a:avLst>
-              <a:gd name="adj1" fmla="val 50000"/>
-            </a:avLst>
-          </a:prstGeom>
-          <a:ln>
-            <a:prstDash val="sysDot"/>
-            <a:tailEnd type="triangle"/>
-          </a:ln>
-        </p:spPr>
-        <p:style>
-          <a:lnRef idx="1">
-            <a:schemeClr val="accent1"/>
-          </a:lnRef>
-          <a:fillRef idx="0">
-            <a:schemeClr val="accent1"/>
-          </a:fillRef>
-          <a:effectRef idx="0">
-            <a:schemeClr val="accent1"/>
-          </a:effectRef>
-          <a:fontRef idx="minor">
-            <a:schemeClr val="tx1"/>
-          </a:fontRef>
-        </p:style>
-      </p:cxnSp>
-      <p:sp>
-        <p:nvSpPr>
-          <p:cNvPr id="40" name="TextBox 39">
-            <a:extLst>
-              <a:ext uri="{FF2B5EF4-FFF2-40B4-BE49-F238E27FC236}">
-                <a16:creationId xmlns:a16="http://schemas.microsoft.com/office/drawing/2014/main" id="{BAC3E68F-82E2-4A63-B911-388755EC754F}"/>
-              </a:ext>
-            </a:extLst>
-          </p:cNvPr>
-          <p:cNvSpPr txBox="1"/>
-          <p:nvPr/>
-        </p:nvSpPr>
-        <p:spPr>
-          <a:xfrm>
-            <a:off x="9051494" y="3918103"/>
-            <a:ext cx="1702646" cy="369332"/>
-          </a:xfrm>
-          <a:prstGeom prst="rect">
-            <a:avLst/>
-          </a:prstGeom>
-          <a:noFill/>
-        </p:spPr>
-        <p:txBody>
-          <a:bodyPr wrap="none" rtlCol="0">
-            <a:spAutoFit/>
-          </a:bodyPr>
-          <a:lstStyle/>
-          <a:p>
-            <a:r>
-              <a:rPr lang="en-US" dirty="0"/>
-              <a:t>Blob(descriptor)</a:t>
-            </a:r>
-          </a:p>
-        </p:txBody>
-      </p:sp>
-      <p:cxnSp>
-        <p:nvCxnSpPr>
-          <p:cNvPr id="42" name="Connector: Elbow 41">
-            <a:extLst>
-              <a:ext uri="{FF2B5EF4-FFF2-40B4-BE49-F238E27FC236}">
-                <a16:creationId xmlns:a16="http://schemas.microsoft.com/office/drawing/2014/main" id="{D43DB1CF-B2EC-4765-85EA-068FE060800E}"/>
-              </a:ext>
-            </a:extLst>
-          </p:cNvPr>
-          <p:cNvCxnSpPr>
-            <a:cxnSpLocks/>
-            <a:stCxn id="10" idx="2"/>
-            <a:endCxn id="40" idx="0"/>
-          </p:cNvCxnSpPr>
-          <p:nvPr/>
-        </p:nvCxnSpPr>
-        <p:spPr>
-          <a:xfrm rot="16200000" flipH="1">
-            <a:off x="6081932" y="97217"/>
-            <a:ext cx="2597473" cy="5044298"/>
-          </a:xfrm>
-          <a:prstGeom prst="bentConnector3">
-            <a:avLst>
-              <a:gd name="adj1" fmla="val 35657"/>
-            </a:avLst>
-          </a:prstGeom>
-          <a:ln w="12700">
-            <a:solidFill>
-              <a:schemeClr val="bg2">
-                <a:lumMod val="75000"/>
-              </a:schemeClr>
-            </a:solidFill>
-            <a:tailEnd type="triangle"/>
-          </a:ln>
-        </p:spPr>
-        <p:style>
-          <a:lnRef idx="1">
-            <a:schemeClr val="accent1"/>
-          </a:lnRef>
-          <a:fillRef idx="0">
-            <a:schemeClr val="accent1"/>
-          </a:fillRef>
-          <a:effectRef idx="0">
-            <a:schemeClr val="accent1"/>
-          </a:effectRef>
-          <a:fontRef idx="minor">
-            <a:schemeClr val="tx1"/>
-          </a:fontRef>
-        </p:style>
-      </p:cxnSp>
-      <p:cxnSp>
-        <p:nvCxnSpPr>
-          <p:cNvPr id="45" name="Connector: Elbow 44">
-            <a:extLst>
-              <a:ext uri="{FF2B5EF4-FFF2-40B4-BE49-F238E27FC236}">
-                <a16:creationId xmlns:a16="http://schemas.microsoft.com/office/drawing/2014/main" id="{04957AB3-7251-46B3-B38D-9234D825F044}"/>
-              </a:ext>
-            </a:extLst>
-          </p:cNvPr>
-          <p:cNvCxnSpPr>
-            <a:stCxn id="10" idx="2"/>
-            <a:endCxn id="34" idx="0"/>
-          </p:cNvCxnSpPr>
-          <p:nvPr/>
-        </p:nvCxnSpPr>
-        <p:spPr>
-          <a:xfrm rot="16200000" flipH="1">
-            <a:off x="5907346" y="271802"/>
-            <a:ext cx="1858809" cy="3956463"/>
-          </a:xfrm>
-          <a:prstGeom prst="bentConnector3">
-            <a:avLst>
-              <a:gd name="adj1" fmla="val 51468"/>
-            </a:avLst>
-          </a:prstGeom>
-          <a:ln w="12700">
-            <a:solidFill>
-              <a:schemeClr val="bg2">
-                <a:lumMod val="75000"/>
-              </a:schemeClr>
-            </a:solidFill>
-            <a:tailEnd type="triangle"/>
-          </a:ln>
-        </p:spPr>
-        <p:style>
-          <a:lnRef idx="1">
-            <a:schemeClr val="accent1"/>
-          </a:lnRef>
-          <a:fillRef idx="0">
-            <a:schemeClr val="accent1"/>
-          </a:fillRef>
-          <a:effectRef idx="0">
-            <a:schemeClr val="accent1"/>
-          </a:effectRef>
-          <a:fontRef idx="minor">
-            <a:schemeClr val="tx1"/>
-          </a:fontRef>
-        </p:style>
-      </p:cxnSp>
-      <p:cxnSp>
-        <p:nvCxnSpPr>
-          <p:cNvPr id="47" name="Connector: Elbow 46">
-            <a:extLst>
-              <a:ext uri="{FF2B5EF4-FFF2-40B4-BE49-F238E27FC236}">
-                <a16:creationId xmlns:a16="http://schemas.microsoft.com/office/drawing/2014/main" id="{4E067498-6D84-4BDD-AAD0-FB8F52672945}"/>
-              </a:ext>
-            </a:extLst>
-          </p:cNvPr>
-          <p:cNvCxnSpPr>
-            <a:stCxn id="34" idx="2"/>
-            <a:endCxn id="40" idx="1"/>
-          </p:cNvCxnSpPr>
-          <p:nvPr/>
-        </p:nvCxnSpPr>
-        <p:spPr>
-          <a:xfrm rot="16200000" flipH="1">
-            <a:off x="8656239" y="3707514"/>
-            <a:ext cx="553998" cy="236512"/>
-          </a:xfrm>
-          <a:prstGeom prst="bentConnector2">
-            <a:avLst/>
-          </a:prstGeom>
-          <a:ln>
-            <a:solidFill>
+            </a:effectRef>
+            <a:fontRef idx="minor">
+              <a:schemeClr val="lt1"/>
+            </a:fontRef>
+          </p:style>
+          <p:txBody>
+            <a:bodyPr rtlCol="0" anchor="ctr"/>
+            <a:lstStyle/>
+            <a:p>
+              <a:pPr algn="ctr"/>
+              <a:endParaRPr lang="en-US"/>
+            </a:p>
+          </p:txBody>
+        </p:sp>
+        <p:sp>
+          <p:nvSpPr>
+            <p:cNvPr id="88" name="TextBox 87">
+              <a:extLst>
+                <a:ext uri="{FF2B5EF4-FFF2-40B4-BE49-F238E27FC236}">
+                  <a16:creationId xmlns:a16="http://schemas.microsoft.com/office/drawing/2014/main" id="{CCECEB54-6353-4C49-A7CA-97B54CC82726}"/>
+                </a:ext>
+              </a:extLst>
+            </p:cNvPr>
+            <p:cNvSpPr txBox="1"/>
+            <p:nvPr/>
+          </p:nvSpPr>
+          <p:spPr>
+            <a:xfrm rot="16200000">
+              <a:off x="-428745" y="2818162"/>
+              <a:ext cx="2482539" cy="646331"/>
+            </a:xfrm>
+            <a:prstGeom prst="rect">
+              <a:avLst/>
+            </a:prstGeom>
+            <a:noFill/>
+          </p:spPr>
+          <p:txBody>
+            <a:bodyPr wrap="none" rtlCol="0">
+              <a:spAutoFit/>
+            </a:bodyPr>
+            <a:lstStyle/>
+            <a:p>
+              <a:pPr algn="ctr"/>
+              <a:r>
+                <a:rPr lang="en-US" dirty="0"/>
+                <a:t>Mapping </a:t>
+              </a:r>
+            </a:p>
+            <a:p>
+              <a:pPr algn="ctr"/>
+              <a:r>
+                <a:rPr lang="en-US" dirty="0"/>
+                <a:t>(Language Independent)</a:t>
+              </a:r>
+            </a:p>
+          </p:txBody>
+        </p:sp>
+        <p:sp>
+          <p:nvSpPr>
+            <p:cNvPr id="97" name="TextBox 96">
+              <a:extLst>
+                <a:ext uri="{FF2B5EF4-FFF2-40B4-BE49-F238E27FC236}">
+                  <a16:creationId xmlns:a16="http://schemas.microsoft.com/office/drawing/2014/main" id="{4F5195CB-CCB2-400C-9DC5-F046E79D95A7}"/>
+                </a:ext>
+              </a:extLst>
+            </p:cNvPr>
+            <p:cNvSpPr txBox="1"/>
+            <p:nvPr/>
+          </p:nvSpPr>
+          <p:spPr>
+            <a:xfrm rot="5400000">
+              <a:off x="9568590" y="2878203"/>
+              <a:ext cx="1007007" cy="307777"/>
+            </a:xfrm>
+            <a:prstGeom prst="rect">
+              <a:avLst/>
+            </a:prstGeom>
+            <a:noFill/>
+          </p:spPr>
+          <p:txBody>
+            <a:bodyPr wrap="none" rtlCol="0">
+              <a:spAutoFit/>
+            </a:bodyPr>
+            <a:lstStyle/>
+            <a:p>
+              <a:r>
+                <a:rPr lang="en-US" sz="1400" dirty="0"/>
+                <a:t>media type</a:t>
+              </a:r>
+            </a:p>
+          </p:txBody>
+        </p:sp>
+        <p:sp>
+          <p:nvSpPr>
+            <p:cNvPr id="98" name="TextBox 97">
+              <a:extLst>
+                <a:ext uri="{FF2B5EF4-FFF2-40B4-BE49-F238E27FC236}">
+                  <a16:creationId xmlns:a16="http://schemas.microsoft.com/office/drawing/2014/main" id="{2D2958E9-5744-43BF-B5E6-A2F806F49127}"/>
+                </a:ext>
+              </a:extLst>
+            </p:cNvPr>
+            <p:cNvSpPr txBox="1"/>
+            <p:nvPr/>
+          </p:nvSpPr>
+          <p:spPr>
+            <a:xfrm>
+              <a:off x="1691188" y="1858470"/>
+              <a:ext cx="1538159" cy="2862322"/>
+            </a:xfrm>
+            <a:prstGeom prst="rect">
+              <a:avLst/>
+            </a:prstGeom>
+            <a:noFill/>
+          </p:spPr>
+          <p:txBody>
+            <a:bodyPr wrap="square" rtlCol="0">
+              <a:spAutoFit/>
+            </a:bodyPr>
+            <a:lstStyle/>
+            <a:p>
+              <a:r>
+                <a:rPr lang="en-US" dirty="0"/>
+                <a:t>Every language binding MUST adhere</a:t>
+              </a:r>
+            </a:p>
+            <a:p>
+              <a:r>
+                <a:rPr lang="en-US" dirty="0"/>
+                <a:t>to this mapping specification to be interoperable </a:t>
+              </a:r>
+            </a:p>
+            <a:p>
+              <a:endParaRPr lang="en-US" dirty="0"/>
+            </a:p>
+          </p:txBody>
+        </p:sp>
+        <p:sp>
+          <p:nvSpPr>
+            <p:cNvPr id="100" name="TextBox 99">
+              <a:extLst>
+                <a:ext uri="{FF2B5EF4-FFF2-40B4-BE49-F238E27FC236}">
+                  <a16:creationId xmlns:a16="http://schemas.microsoft.com/office/drawing/2014/main" id="{088F3E27-95F6-4C2B-A936-4DC5614E75EB}"/>
+                </a:ext>
+              </a:extLst>
+            </p:cNvPr>
+            <p:cNvSpPr txBox="1"/>
+            <p:nvPr/>
+          </p:nvSpPr>
+          <p:spPr>
+            <a:xfrm>
+              <a:off x="9964523" y="4601297"/>
+              <a:ext cx="644728" cy="369332"/>
+            </a:xfrm>
+            <a:prstGeom prst="rect">
+              <a:avLst/>
+            </a:prstGeom>
+            <a:noFill/>
+          </p:spPr>
+          <p:txBody>
+            <a:bodyPr wrap="none" rtlCol="0">
+              <a:spAutoFit/>
+            </a:bodyPr>
+            <a:lstStyle/>
+            <a:p>
+              <a:r>
+                <a:rPr lang="en-US" dirty="0"/>
+                <a:t>Json </a:t>
+              </a:r>
+            </a:p>
+          </p:txBody>
+        </p:sp>
+        <p:cxnSp>
+          <p:nvCxnSpPr>
+            <p:cNvPr id="102" name="Connector: Elbow 101">
+              <a:extLst>
+                <a:ext uri="{FF2B5EF4-FFF2-40B4-BE49-F238E27FC236}">
+                  <a16:creationId xmlns:a16="http://schemas.microsoft.com/office/drawing/2014/main" id="{0E81B0D4-B750-4D2E-91DD-5DD9B44881F3}"/>
+                </a:ext>
+              </a:extLst>
+            </p:cNvPr>
+            <p:cNvCxnSpPr>
+              <a:cxnSpLocks/>
+              <a:stCxn id="100" idx="1"/>
+              <a:endCxn id="23" idx="3"/>
+            </p:cNvCxnSpPr>
+            <p:nvPr/>
+          </p:nvCxnSpPr>
+          <p:spPr>
+            <a:xfrm rot="10800000">
+              <a:off x="8377871" y="4126287"/>
+              <a:ext cx="1586653" cy="659676"/>
+            </a:xfrm>
+            <a:prstGeom prst="bentConnector3">
+              <a:avLst>
+                <a:gd name="adj1" fmla="val 83976"/>
+              </a:avLst>
+            </a:prstGeom>
+            <a:ln>
+              <a:solidFill>
+                <a:schemeClr val="accent1"/>
+              </a:solidFill>
+              <a:prstDash val="sysDot"/>
+              <a:tailEnd type="triangle"/>
+            </a:ln>
+          </p:spPr>
+          <p:style>
+            <a:lnRef idx="1">
               <a:schemeClr val="accent1"/>
-            </a:solidFill>
-            <a:prstDash val="sysDot"/>
-            <a:tailEnd type="triangle"/>
-          </a:ln>
-        </p:spPr>
-        <p:style>
-          <a:lnRef idx="1">
-            <a:schemeClr val="accent1"/>
-          </a:lnRef>
-          <a:fillRef idx="0">
-            <a:schemeClr val="accent1"/>
-          </a:fillRef>
-          <a:effectRef idx="0">
-            <a:schemeClr val="accent1"/>
-          </a:effectRef>
-          <a:fontRef idx="minor">
-            <a:schemeClr val="tx1"/>
-          </a:fontRef>
-        </p:style>
-      </p:cxnSp>
-      <p:cxnSp>
-        <p:nvCxnSpPr>
-          <p:cNvPr id="55" name="Connector: Elbow 54">
-            <a:extLst>
-              <a:ext uri="{FF2B5EF4-FFF2-40B4-BE49-F238E27FC236}">
-                <a16:creationId xmlns:a16="http://schemas.microsoft.com/office/drawing/2014/main" id="{E988BB19-9A5B-44B1-8E62-61E85656A341}"/>
-              </a:ext>
-            </a:extLst>
-          </p:cNvPr>
-          <p:cNvCxnSpPr>
-            <a:stCxn id="10" idx="3"/>
-            <a:endCxn id="11" idx="1"/>
-          </p:cNvCxnSpPr>
-          <p:nvPr/>
-        </p:nvCxnSpPr>
-        <p:spPr>
-          <a:xfrm>
-            <a:off x="5992515" y="1135964"/>
-            <a:ext cx="542616" cy="334600"/>
-          </a:xfrm>
-          <a:prstGeom prst="bentConnector3">
-            <a:avLst/>
-          </a:prstGeom>
-          <a:ln>
-            <a:solidFill>
-              <a:schemeClr val="accent6"/>
-            </a:solidFill>
-            <a:tailEnd type="triangle"/>
-          </a:ln>
-        </p:spPr>
-        <p:style>
-          <a:lnRef idx="1">
-            <a:schemeClr val="accent1"/>
-          </a:lnRef>
-          <a:fillRef idx="0">
-            <a:schemeClr val="accent1"/>
-          </a:fillRef>
-          <a:effectRef idx="0">
-            <a:schemeClr val="accent1"/>
-          </a:effectRef>
-          <a:fontRef idx="minor">
-            <a:schemeClr val="tx1"/>
-          </a:fontRef>
-        </p:style>
-      </p:cxnSp>
-      <p:cxnSp>
-        <p:nvCxnSpPr>
-          <p:cNvPr id="57" name="Connector: Elbow 56">
-            <a:extLst>
-              <a:ext uri="{FF2B5EF4-FFF2-40B4-BE49-F238E27FC236}">
-                <a16:creationId xmlns:a16="http://schemas.microsoft.com/office/drawing/2014/main" id="{0D1DF802-9A33-4BE7-98F0-1719BCA5F63E}"/>
-              </a:ext>
-            </a:extLst>
-          </p:cNvPr>
-          <p:cNvCxnSpPr>
-            <a:cxnSpLocks/>
-            <a:stCxn id="11" idx="2"/>
-            <a:endCxn id="58" idx="1"/>
-          </p:cNvCxnSpPr>
-          <p:nvPr/>
-        </p:nvCxnSpPr>
-        <p:spPr>
-          <a:xfrm rot="16200000" flipH="1">
-            <a:off x="5787569" y="3083908"/>
-            <a:ext cx="2773534" cy="193176"/>
-          </a:xfrm>
-          <a:prstGeom prst="bentConnector2">
-            <a:avLst/>
-          </a:prstGeom>
-          <a:ln w="12700">
-            <a:solidFill>
-              <a:schemeClr val="bg2">
-                <a:lumMod val="75000"/>
-              </a:schemeClr>
-            </a:solidFill>
-            <a:tailEnd type="triangle"/>
-          </a:ln>
-        </p:spPr>
-        <p:style>
-          <a:lnRef idx="1">
-            <a:schemeClr val="accent1"/>
-          </a:lnRef>
-          <a:fillRef idx="0">
-            <a:schemeClr val="accent1"/>
-          </a:fillRef>
-          <a:effectRef idx="0">
-            <a:schemeClr val="accent1"/>
-          </a:effectRef>
-          <a:fontRef idx="minor">
-            <a:schemeClr val="tx1"/>
-          </a:fontRef>
-        </p:style>
-      </p:cxnSp>
-      <p:sp>
-        <p:nvSpPr>
-          <p:cNvPr id="58" name="TextBox 57">
-            <a:extLst>
-              <a:ext uri="{FF2B5EF4-FFF2-40B4-BE49-F238E27FC236}">
-                <a16:creationId xmlns:a16="http://schemas.microsoft.com/office/drawing/2014/main" id="{9CFA9F83-334D-4705-AEFF-1056FF1D3051}"/>
-              </a:ext>
-            </a:extLst>
-          </p:cNvPr>
-          <p:cNvSpPr txBox="1"/>
-          <p:nvPr/>
-        </p:nvSpPr>
-        <p:spPr>
-          <a:xfrm>
-            <a:off x="7270924" y="4382597"/>
-            <a:ext cx="1298048" cy="369332"/>
-          </a:xfrm>
-          <a:prstGeom prst="rect">
-            <a:avLst/>
-          </a:prstGeom>
-          <a:noFill/>
-        </p:spPr>
-        <p:txBody>
-          <a:bodyPr wrap="none" rtlCol="0">
-            <a:spAutoFit/>
-          </a:bodyPr>
-          <a:lstStyle/>
-          <a:p>
-            <a:r>
-              <a:rPr lang="en-US" dirty="0"/>
-              <a:t>Layer (blob)</a:t>
-            </a:r>
-          </a:p>
-        </p:txBody>
-      </p:sp>
-      <p:sp>
-        <p:nvSpPr>
-          <p:cNvPr id="71" name="TextBox 70">
-            <a:extLst>
-              <a:ext uri="{FF2B5EF4-FFF2-40B4-BE49-F238E27FC236}">
-                <a16:creationId xmlns:a16="http://schemas.microsoft.com/office/drawing/2014/main" id="{3AD2FC1F-9C62-409C-9208-B35E4D808CE3}"/>
-              </a:ext>
-            </a:extLst>
-          </p:cNvPr>
-          <p:cNvSpPr txBox="1"/>
-          <p:nvPr/>
-        </p:nvSpPr>
-        <p:spPr>
-          <a:xfrm rot="16200000">
-            <a:off x="6696069" y="3569679"/>
-            <a:ext cx="558358" cy="276999"/>
-          </a:xfrm>
-          <a:prstGeom prst="rect">
-            <a:avLst/>
-          </a:prstGeom>
-          <a:noFill/>
-        </p:spPr>
-        <p:txBody>
-          <a:bodyPr wrap="none" rtlCol="0">
-            <a:spAutoFit/>
-          </a:bodyPr>
-          <a:lstStyle/>
-          <a:p>
-            <a:r>
-              <a:rPr lang="en-US" sz="1200" dirty="0"/>
-              <a:t>digest</a:t>
-            </a:r>
-          </a:p>
-        </p:txBody>
-      </p:sp>
-      <p:cxnSp>
-        <p:nvCxnSpPr>
-          <p:cNvPr id="72" name="Connector: Elbow 71">
-            <a:extLst>
-              <a:ext uri="{FF2B5EF4-FFF2-40B4-BE49-F238E27FC236}">
-                <a16:creationId xmlns:a16="http://schemas.microsoft.com/office/drawing/2014/main" id="{B65291E1-1553-4C09-9A35-672B55834668}"/>
-              </a:ext>
-            </a:extLst>
-          </p:cNvPr>
-          <p:cNvCxnSpPr>
-            <a:cxnSpLocks/>
-            <a:stCxn id="9" idx="2"/>
-            <a:endCxn id="10" idx="1"/>
-          </p:cNvCxnSpPr>
-          <p:nvPr/>
-        </p:nvCxnSpPr>
-        <p:spPr>
-          <a:xfrm rot="16200000" flipH="1">
-            <a:off x="3383411" y="794852"/>
-            <a:ext cx="268121" cy="414102"/>
-          </a:xfrm>
-          <a:prstGeom prst="bentConnector2">
-            <a:avLst/>
-          </a:prstGeom>
-          <a:ln>
-            <a:solidFill>
-              <a:schemeClr val="accent6"/>
-            </a:solidFill>
-            <a:tailEnd type="triangle"/>
-          </a:ln>
-        </p:spPr>
-        <p:style>
-          <a:lnRef idx="1">
-            <a:schemeClr val="accent1"/>
-          </a:lnRef>
-          <a:fillRef idx="0">
-            <a:schemeClr val="accent1"/>
-          </a:fillRef>
-          <a:effectRef idx="0">
-            <a:schemeClr val="accent1"/>
-          </a:effectRef>
-          <a:fontRef idx="minor">
-            <a:schemeClr val="tx1"/>
-          </a:fontRef>
-        </p:style>
-      </p:cxnSp>
-      <p:cxnSp>
-        <p:nvCxnSpPr>
-          <p:cNvPr id="84" name="Connector: Elbow 83">
-            <a:extLst>
-              <a:ext uri="{FF2B5EF4-FFF2-40B4-BE49-F238E27FC236}">
-                <a16:creationId xmlns:a16="http://schemas.microsoft.com/office/drawing/2014/main" id="{B0D740BA-22F7-46A4-AE0B-D5E58BA40DD7}"/>
-              </a:ext>
-            </a:extLst>
-          </p:cNvPr>
-          <p:cNvCxnSpPr>
-            <a:cxnSpLocks/>
-            <a:stCxn id="12" idx="2"/>
-            <a:endCxn id="58" idx="1"/>
-          </p:cNvCxnSpPr>
-          <p:nvPr/>
-        </p:nvCxnSpPr>
-        <p:spPr>
-          <a:xfrm rot="16200000" flipH="1">
-            <a:off x="6200796" y="3497135"/>
-            <a:ext cx="1031068" cy="1109187"/>
-          </a:xfrm>
-          <a:prstGeom prst="bentConnector2">
-            <a:avLst/>
-          </a:prstGeom>
-          <a:ln>
-            <a:solidFill>
+            </a:lnRef>
+            <a:fillRef idx="0">
               <a:schemeClr val="accent1"/>
-            </a:solidFill>
-            <a:prstDash val="sysDot"/>
-            <a:tailEnd type="triangle"/>
-          </a:ln>
-        </p:spPr>
-        <p:style>
-          <a:lnRef idx="1">
-            <a:schemeClr val="accent1"/>
-          </a:lnRef>
-          <a:fillRef idx="0">
-            <a:schemeClr val="accent1"/>
-          </a:fillRef>
-          <a:effectRef idx="0">
-            <a:schemeClr val="accent1"/>
-          </a:effectRef>
-          <a:fontRef idx="minor">
-            <a:schemeClr val="tx1"/>
-          </a:fontRef>
-        </p:style>
-      </p:cxnSp>
-      <p:sp>
-        <p:nvSpPr>
-          <p:cNvPr id="87" name="Arrow: Down 86">
-            <a:extLst>
-              <a:ext uri="{FF2B5EF4-FFF2-40B4-BE49-F238E27FC236}">
-                <a16:creationId xmlns:a16="http://schemas.microsoft.com/office/drawing/2014/main" id="{70EF0D0A-C0C8-4BB0-95E1-A3D98C62D114}"/>
-              </a:ext>
-            </a:extLst>
-          </p:cNvPr>
-          <p:cNvSpPr/>
-          <p:nvPr/>
-        </p:nvSpPr>
-        <p:spPr>
-          <a:xfrm>
-            <a:off x="1024147" y="1749592"/>
-            <a:ext cx="772858" cy="3221037"/>
-          </a:xfrm>
-          <a:prstGeom prst="downArrow">
-            <a:avLst/>
-          </a:prstGeom>
-          <a:solidFill>
-            <a:schemeClr val="bg2">
-              <a:lumMod val="75000"/>
-            </a:schemeClr>
-          </a:solidFill>
-          <a:ln>
+            </a:fillRef>
+            <a:effectRef idx="0">
+              <a:schemeClr val="accent1"/>
+            </a:effectRef>
+            <a:fontRef idx="minor">
+              <a:schemeClr val="tx1"/>
+            </a:fontRef>
+          </p:style>
+        </p:cxnSp>
+        <p:cxnSp>
+          <p:nvCxnSpPr>
+            <p:cNvPr id="107" name="Connector: Elbow 106">
+              <a:extLst>
+                <a:ext uri="{FF2B5EF4-FFF2-40B4-BE49-F238E27FC236}">
+                  <a16:creationId xmlns:a16="http://schemas.microsoft.com/office/drawing/2014/main" id="{A643E5F4-71CD-4066-820C-0448B2E5129D}"/>
+                </a:ext>
+              </a:extLst>
+            </p:cNvPr>
+            <p:cNvCxnSpPr>
+              <a:stCxn id="40" idx="2"/>
+              <a:endCxn id="100" idx="0"/>
+            </p:cNvCxnSpPr>
+            <p:nvPr/>
+          </p:nvCxnSpPr>
+          <p:spPr>
+            <a:xfrm rot="16200000" flipH="1">
+              <a:off x="9937921" y="4252331"/>
+              <a:ext cx="313862" cy="384070"/>
+            </a:xfrm>
+            <a:prstGeom prst="bentConnector3">
+              <a:avLst/>
+            </a:prstGeom>
+            <a:ln>
+              <a:tailEnd type="triangle"/>
+            </a:ln>
+          </p:spPr>
+          <p:style>
+            <a:lnRef idx="1">
+              <a:schemeClr val="accent1"/>
+            </a:lnRef>
+            <a:fillRef idx="0">
+              <a:schemeClr val="accent1"/>
+            </a:fillRef>
+            <a:effectRef idx="0">
+              <a:schemeClr val="accent1"/>
+            </a:effectRef>
+            <a:fontRef idx="minor">
+              <a:schemeClr val="tx1"/>
+            </a:fontRef>
+          </p:style>
+        </p:cxnSp>
+        <p:sp>
+          <p:nvSpPr>
+            <p:cNvPr id="114" name="TextBox 113">
+              <a:extLst>
+                <a:ext uri="{FF2B5EF4-FFF2-40B4-BE49-F238E27FC236}">
+                  <a16:creationId xmlns:a16="http://schemas.microsoft.com/office/drawing/2014/main" id="{8A170EFC-497F-4E91-A012-2952A6ED6114}"/>
+                </a:ext>
+              </a:extLst>
+            </p:cNvPr>
+            <p:cNvSpPr txBox="1"/>
+            <p:nvPr/>
+          </p:nvSpPr>
+          <p:spPr>
+            <a:xfrm>
+              <a:off x="9325093" y="4567263"/>
+              <a:ext cx="558358" cy="276999"/>
+            </a:xfrm>
+            <a:prstGeom prst="rect">
+              <a:avLst/>
+            </a:prstGeom>
             <a:noFill/>
-          </a:ln>
-        </p:spPr>
-        <p:style>
-          <a:lnRef idx="2">
-            <a:schemeClr val="accent1">
-              <a:shade val="50000"/>
-            </a:schemeClr>
-          </a:lnRef>
-          <a:fillRef idx="1">
-            <a:schemeClr val="accent1"/>
-          </a:fillRef>
-          <a:effectRef idx="0">
-            <a:schemeClr val="accent1"/>
-          </a:effectRef>
-          <a:fontRef idx="minor">
-            <a:schemeClr val="lt1"/>
-          </a:fontRef>
-        </p:style>
-        <p:txBody>
-          <a:bodyPr rtlCol="0" anchor="ctr"/>
-          <a:lstStyle/>
-          <a:p>
-            <a:pPr algn="ctr"/>
-            <a:endParaRPr lang="en-US"/>
-          </a:p>
-        </p:txBody>
-      </p:sp>
-      <p:sp>
-        <p:nvSpPr>
-          <p:cNvPr id="88" name="TextBox 87">
-            <a:extLst>
-              <a:ext uri="{FF2B5EF4-FFF2-40B4-BE49-F238E27FC236}">
-                <a16:creationId xmlns:a16="http://schemas.microsoft.com/office/drawing/2014/main" id="{CCECEB54-6353-4C49-A7CA-97B54CC82726}"/>
-              </a:ext>
-            </a:extLst>
-          </p:cNvPr>
-          <p:cNvSpPr txBox="1"/>
-          <p:nvPr/>
-        </p:nvSpPr>
-        <p:spPr>
-          <a:xfrm rot="16200000">
-            <a:off x="-428745" y="2818162"/>
-            <a:ext cx="2482539" cy="646331"/>
-          </a:xfrm>
-          <a:prstGeom prst="rect">
-            <a:avLst/>
-          </a:prstGeom>
-          <a:noFill/>
-        </p:spPr>
-        <p:txBody>
-          <a:bodyPr wrap="none" rtlCol="0">
-            <a:spAutoFit/>
-          </a:bodyPr>
-          <a:lstStyle/>
-          <a:p>
-            <a:pPr algn="ctr"/>
-            <a:r>
-              <a:rPr lang="en-US" dirty="0"/>
-              <a:t>Mapping </a:t>
-            </a:r>
-          </a:p>
-          <a:p>
-            <a:pPr algn="ctr"/>
-            <a:r>
-              <a:rPr lang="en-US" dirty="0"/>
-              <a:t>(Language Independent)</a:t>
-            </a:r>
-          </a:p>
-        </p:txBody>
-      </p:sp>
-      <p:sp>
-        <p:nvSpPr>
-          <p:cNvPr id="97" name="TextBox 96">
-            <a:extLst>
-              <a:ext uri="{FF2B5EF4-FFF2-40B4-BE49-F238E27FC236}">
-                <a16:creationId xmlns:a16="http://schemas.microsoft.com/office/drawing/2014/main" id="{4F5195CB-CCB2-400C-9DC5-F046E79D95A7}"/>
-              </a:ext>
-            </a:extLst>
-          </p:cNvPr>
-          <p:cNvSpPr txBox="1"/>
-          <p:nvPr/>
-        </p:nvSpPr>
-        <p:spPr>
-          <a:xfrm rot="5400000">
-            <a:off x="9568590" y="2878203"/>
-            <a:ext cx="1007007" cy="307777"/>
-          </a:xfrm>
-          <a:prstGeom prst="rect">
-            <a:avLst/>
-          </a:prstGeom>
-          <a:noFill/>
-        </p:spPr>
-        <p:txBody>
-          <a:bodyPr wrap="none" rtlCol="0">
-            <a:spAutoFit/>
-          </a:bodyPr>
-          <a:lstStyle/>
-          <a:p>
-            <a:r>
-              <a:rPr lang="en-US" sz="1400" dirty="0"/>
-              <a:t>media type</a:t>
-            </a:r>
-          </a:p>
-        </p:txBody>
-      </p:sp>
-      <p:sp>
-        <p:nvSpPr>
-          <p:cNvPr id="98" name="TextBox 97">
-            <a:extLst>
-              <a:ext uri="{FF2B5EF4-FFF2-40B4-BE49-F238E27FC236}">
-                <a16:creationId xmlns:a16="http://schemas.microsoft.com/office/drawing/2014/main" id="{2D2958E9-5744-43BF-B5E6-A2F806F49127}"/>
-              </a:ext>
-            </a:extLst>
-          </p:cNvPr>
-          <p:cNvSpPr txBox="1"/>
-          <p:nvPr/>
-        </p:nvSpPr>
-        <p:spPr>
-          <a:xfrm>
-            <a:off x="1691188" y="1858470"/>
-            <a:ext cx="1476027" cy="2862322"/>
-          </a:xfrm>
-          <a:prstGeom prst="rect">
-            <a:avLst/>
-          </a:prstGeom>
-          <a:noFill/>
-        </p:spPr>
-        <p:txBody>
-          <a:bodyPr wrap="square" rtlCol="0">
-            <a:spAutoFit/>
-          </a:bodyPr>
-          <a:lstStyle/>
-          <a:p>
-            <a:r>
-              <a:rPr lang="en-US" dirty="0"/>
-              <a:t>Every language binding MUST adhere</a:t>
-            </a:r>
-          </a:p>
-          <a:p>
-            <a:r>
-              <a:rPr lang="en-US" dirty="0"/>
-              <a:t>to this mapping specification to be interoperable </a:t>
-            </a:r>
-          </a:p>
-          <a:p>
-            <a:endParaRPr lang="en-US" dirty="0"/>
-          </a:p>
-        </p:txBody>
-      </p:sp>
-      <p:sp>
-        <p:nvSpPr>
-          <p:cNvPr id="100" name="TextBox 99">
-            <a:extLst>
-              <a:ext uri="{FF2B5EF4-FFF2-40B4-BE49-F238E27FC236}">
-                <a16:creationId xmlns:a16="http://schemas.microsoft.com/office/drawing/2014/main" id="{088F3E27-95F6-4C2B-A936-4DC5614E75EB}"/>
-              </a:ext>
-            </a:extLst>
-          </p:cNvPr>
-          <p:cNvSpPr txBox="1"/>
-          <p:nvPr/>
-        </p:nvSpPr>
-        <p:spPr>
-          <a:xfrm>
-            <a:off x="9964523" y="4601297"/>
-            <a:ext cx="644728" cy="369332"/>
-          </a:xfrm>
-          <a:prstGeom prst="rect">
-            <a:avLst/>
-          </a:prstGeom>
-          <a:noFill/>
-        </p:spPr>
-        <p:txBody>
-          <a:bodyPr wrap="none" rtlCol="0">
-            <a:spAutoFit/>
-          </a:bodyPr>
-          <a:lstStyle/>
-          <a:p>
-            <a:r>
-              <a:rPr lang="en-US" dirty="0"/>
-              <a:t>Json </a:t>
-            </a:r>
-          </a:p>
-        </p:txBody>
-      </p:sp>
-      <p:cxnSp>
-        <p:nvCxnSpPr>
-          <p:cNvPr id="102" name="Connector: Elbow 101">
-            <a:extLst>
-              <a:ext uri="{FF2B5EF4-FFF2-40B4-BE49-F238E27FC236}">
-                <a16:creationId xmlns:a16="http://schemas.microsoft.com/office/drawing/2014/main" id="{0E81B0D4-B750-4D2E-91DD-5DD9B44881F3}"/>
-              </a:ext>
-            </a:extLst>
-          </p:cNvPr>
-          <p:cNvCxnSpPr>
-            <a:cxnSpLocks/>
-            <a:stCxn id="100" idx="1"/>
-            <a:endCxn id="23" idx="3"/>
-          </p:cNvCxnSpPr>
-          <p:nvPr/>
-        </p:nvCxnSpPr>
-        <p:spPr>
-          <a:xfrm rot="10800000">
-            <a:off x="8377871" y="4126287"/>
-            <a:ext cx="1586653" cy="659676"/>
-          </a:xfrm>
-          <a:prstGeom prst="bentConnector3">
-            <a:avLst>
-              <a:gd name="adj1" fmla="val 83976"/>
-            </a:avLst>
-          </a:prstGeom>
-          <a:ln>
-            <a:solidFill>
+          </p:spPr>
+          <p:txBody>
+            <a:bodyPr wrap="none" rtlCol="0">
+              <a:spAutoFit/>
+            </a:bodyPr>
+            <a:lstStyle/>
+            <a:p>
+              <a:r>
+                <a:rPr lang="en-US" sz="1200" dirty="0"/>
+                <a:t>digest</a:t>
+              </a:r>
+            </a:p>
+          </p:txBody>
+        </p:sp>
+        <p:sp>
+          <p:nvSpPr>
+            <p:cNvPr id="115" name="TextBox 114">
+              <a:extLst>
+                <a:ext uri="{FF2B5EF4-FFF2-40B4-BE49-F238E27FC236}">
+                  <a16:creationId xmlns:a16="http://schemas.microsoft.com/office/drawing/2014/main" id="{6F86B866-3AED-4DED-9DE4-8621DE7BABF1}"/>
+                </a:ext>
+              </a:extLst>
+            </p:cNvPr>
+            <p:cNvSpPr txBox="1"/>
+            <p:nvPr/>
+          </p:nvSpPr>
+          <p:spPr>
+            <a:xfrm>
+              <a:off x="2933262" y="5078784"/>
+              <a:ext cx="1242328" cy="369332"/>
+            </a:xfrm>
+            <a:prstGeom prst="rect">
+              <a:avLst/>
+            </a:prstGeom>
+            <a:noFill/>
+          </p:spPr>
+          <p:txBody>
+            <a:bodyPr wrap="none" rtlCol="0">
+              <a:spAutoFit/>
+            </a:bodyPr>
+            <a:lstStyle/>
+            <a:p>
+              <a:r>
+                <a:rPr lang="en-US" dirty="0">
+                  <a:solidFill>
+                    <a:schemeClr val="accent1"/>
+                  </a:solidFill>
+                </a:rPr>
+                <a:t>Repository </a:t>
+              </a:r>
+            </a:p>
+          </p:txBody>
+        </p:sp>
+        <p:cxnSp>
+          <p:nvCxnSpPr>
+            <p:cNvPr id="116" name="Connector: Elbow 115">
+              <a:extLst>
+                <a:ext uri="{FF2B5EF4-FFF2-40B4-BE49-F238E27FC236}">
+                  <a16:creationId xmlns:a16="http://schemas.microsoft.com/office/drawing/2014/main" id="{3BD21D01-03BB-4EFF-9DCE-EC072B680589}"/>
+                </a:ext>
+              </a:extLst>
+            </p:cNvPr>
+            <p:cNvCxnSpPr>
+              <a:cxnSpLocks/>
+              <a:stCxn id="9" idx="2"/>
+              <a:endCxn id="118" idx="1"/>
+            </p:cNvCxnSpPr>
+            <p:nvPr/>
+          </p:nvCxnSpPr>
+          <p:spPr>
+            <a:xfrm rot="16200000" flipH="1">
+              <a:off x="2750986" y="1427276"/>
+              <a:ext cx="1960114" cy="841247"/>
+            </a:xfrm>
+            <a:prstGeom prst="bentConnector2">
+              <a:avLst/>
+            </a:prstGeom>
+            <a:ln w="12700">
+              <a:solidFill>
+                <a:schemeClr val="bg2">
+                  <a:lumMod val="75000"/>
+                </a:schemeClr>
+              </a:solidFill>
+              <a:tailEnd type="triangle"/>
+            </a:ln>
+          </p:spPr>
+          <p:style>
+            <a:lnRef idx="1">
               <a:schemeClr val="accent1"/>
-            </a:solidFill>
-            <a:prstDash val="sysDot"/>
-            <a:tailEnd type="triangle"/>
-          </a:ln>
-        </p:spPr>
-        <p:style>
-          <a:lnRef idx="1">
-            <a:schemeClr val="accent1"/>
-          </a:lnRef>
-          <a:fillRef idx="0">
-            <a:schemeClr val="accent1"/>
-          </a:fillRef>
-          <a:effectRef idx="0">
-            <a:schemeClr val="accent1"/>
-          </a:effectRef>
-          <a:fontRef idx="minor">
-            <a:schemeClr val="tx1"/>
-          </a:fontRef>
-        </p:style>
-      </p:cxnSp>
-      <p:cxnSp>
-        <p:nvCxnSpPr>
-          <p:cNvPr id="107" name="Connector: Elbow 106">
-            <a:extLst>
-              <a:ext uri="{FF2B5EF4-FFF2-40B4-BE49-F238E27FC236}">
-                <a16:creationId xmlns:a16="http://schemas.microsoft.com/office/drawing/2014/main" id="{A643E5F4-71CD-4066-820C-0448B2E5129D}"/>
-              </a:ext>
-            </a:extLst>
-          </p:cNvPr>
-          <p:cNvCxnSpPr>
-            <a:stCxn id="40" idx="2"/>
-            <a:endCxn id="100" idx="0"/>
-          </p:cNvCxnSpPr>
-          <p:nvPr/>
-        </p:nvCxnSpPr>
-        <p:spPr>
-          <a:xfrm rot="16200000" flipH="1">
-            <a:off x="9937921" y="4252331"/>
-            <a:ext cx="313862" cy="384070"/>
-          </a:xfrm>
-          <a:prstGeom prst="bentConnector3">
-            <a:avLst/>
-          </a:prstGeom>
-          <a:ln>
-            <a:tailEnd type="triangle"/>
-          </a:ln>
-        </p:spPr>
-        <p:style>
-          <a:lnRef idx="1">
-            <a:schemeClr val="accent1"/>
-          </a:lnRef>
-          <a:fillRef idx="0">
-            <a:schemeClr val="accent1"/>
-          </a:fillRef>
-          <a:effectRef idx="0">
-            <a:schemeClr val="accent1"/>
-          </a:effectRef>
-          <a:fontRef idx="minor">
-            <a:schemeClr val="tx1"/>
-          </a:fontRef>
-        </p:style>
-      </p:cxnSp>
-      <p:sp>
-        <p:nvSpPr>
-          <p:cNvPr id="114" name="TextBox 113">
-            <a:extLst>
-              <a:ext uri="{FF2B5EF4-FFF2-40B4-BE49-F238E27FC236}">
-                <a16:creationId xmlns:a16="http://schemas.microsoft.com/office/drawing/2014/main" id="{8A170EFC-497F-4E91-A012-2952A6ED6114}"/>
-              </a:ext>
-            </a:extLst>
-          </p:cNvPr>
-          <p:cNvSpPr txBox="1"/>
-          <p:nvPr/>
-        </p:nvSpPr>
-        <p:spPr>
-          <a:xfrm>
-            <a:off x="9325093" y="4567263"/>
-            <a:ext cx="558358" cy="276999"/>
-          </a:xfrm>
-          <a:prstGeom prst="rect">
-            <a:avLst/>
-          </a:prstGeom>
-          <a:noFill/>
-        </p:spPr>
-        <p:txBody>
-          <a:bodyPr wrap="none" rtlCol="0">
-            <a:spAutoFit/>
-          </a:bodyPr>
-          <a:lstStyle/>
-          <a:p>
-            <a:r>
-              <a:rPr lang="en-US" sz="1200" dirty="0"/>
-              <a:t>digest</a:t>
-            </a:r>
-          </a:p>
-        </p:txBody>
-      </p:sp>
-      <p:sp>
-        <p:nvSpPr>
-          <p:cNvPr id="115" name="TextBox 114">
-            <a:extLst>
-              <a:ext uri="{FF2B5EF4-FFF2-40B4-BE49-F238E27FC236}">
-                <a16:creationId xmlns:a16="http://schemas.microsoft.com/office/drawing/2014/main" id="{6F86B866-3AED-4DED-9DE4-8621DE7BABF1}"/>
-              </a:ext>
-            </a:extLst>
-          </p:cNvPr>
-          <p:cNvSpPr txBox="1"/>
-          <p:nvPr/>
-        </p:nvSpPr>
-        <p:spPr>
-          <a:xfrm>
-            <a:off x="2085388" y="5078784"/>
-            <a:ext cx="1242328" cy="369332"/>
-          </a:xfrm>
-          <a:prstGeom prst="rect">
-            <a:avLst/>
-          </a:prstGeom>
-          <a:noFill/>
-        </p:spPr>
-        <p:txBody>
-          <a:bodyPr wrap="none" rtlCol="0">
-            <a:spAutoFit/>
-          </a:bodyPr>
-          <a:lstStyle/>
-          <a:p>
-            <a:r>
-              <a:rPr lang="en-US" dirty="0">
-                <a:solidFill>
-                  <a:schemeClr val="accent1"/>
-                </a:solidFill>
-              </a:rPr>
-              <a:t>Repository </a:t>
-            </a:r>
-          </a:p>
-        </p:txBody>
-      </p:sp>
-      <p:cxnSp>
-        <p:nvCxnSpPr>
-          <p:cNvPr id="116" name="Connector: Elbow 115">
-            <a:extLst>
-              <a:ext uri="{FF2B5EF4-FFF2-40B4-BE49-F238E27FC236}">
-                <a16:creationId xmlns:a16="http://schemas.microsoft.com/office/drawing/2014/main" id="{3BD21D01-03BB-4EFF-9DCE-EC072B680589}"/>
-              </a:ext>
-            </a:extLst>
-          </p:cNvPr>
-          <p:cNvCxnSpPr>
-            <a:cxnSpLocks/>
-            <a:stCxn id="9" idx="2"/>
-            <a:endCxn id="118" idx="1"/>
-          </p:cNvCxnSpPr>
-          <p:nvPr/>
-        </p:nvCxnSpPr>
-        <p:spPr>
-          <a:xfrm rot="16200000" flipH="1">
-            <a:off x="2750986" y="1427276"/>
-            <a:ext cx="1960114" cy="841247"/>
-          </a:xfrm>
-          <a:prstGeom prst="bentConnector2">
-            <a:avLst/>
-          </a:prstGeom>
-          <a:ln w="12700">
-            <a:solidFill>
-              <a:schemeClr val="bg2">
-                <a:lumMod val="75000"/>
-              </a:schemeClr>
-            </a:solidFill>
-            <a:tailEnd type="triangle"/>
-          </a:ln>
-        </p:spPr>
-        <p:style>
-          <a:lnRef idx="1">
-            <a:schemeClr val="accent1"/>
-          </a:lnRef>
-          <a:fillRef idx="0">
-            <a:schemeClr val="accent1"/>
-          </a:fillRef>
-          <a:effectRef idx="0">
-            <a:schemeClr val="accent1"/>
-          </a:effectRef>
-          <a:fontRef idx="minor">
-            <a:schemeClr val="tx1"/>
-          </a:fontRef>
-        </p:style>
-      </p:cxnSp>
-      <p:sp>
-        <p:nvSpPr>
-          <p:cNvPr id="118" name="TextBox 117">
-            <a:extLst>
-              <a:ext uri="{FF2B5EF4-FFF2-40B4-BE49-F238E27FC236}">
-                <a16:creationId xmlns:a16="http://schemas.microsoft.com/office/drawing/2014/main" id="{CADC1FB8-FF77-4731-9EEC-027A9E5D992B}"/>
-              </a:ext>
-            </a:extLst>
-          </p:cNvPr>
-          <p:cNvSpPr txBox="1"/>
-          <p:nvPr/>
-        </p:nvSpPr>
-        <p:spPr>
-          <a:xfrm>
-            <a:off x="4151667" y="2643291"/>
-            <a:ext cx="1189428" cy="369332"/>
-          </a:xfrm>
-          <a:prstGeom prst="rect">
-            <a:avLst/>
-          </a:prstGeom>
-          <a:noFill/>
-        </p:spPr>
-        <p:txBody>
-          <a:bodyPr wrap="none" rtlCol="0">
-            <a:spAutoFit/>
-          </a:bodyPr>
-          <a:lstStyle/>
-          <a:p>
-            <a:r>
-              <a:rPr lang="en-US" dirty="0"/>
-              <a:t>Repository</a:t>
-            </a:r>
-          </a:p>
-        </p:txBody>
-      </p:sp>
-      <p:sp>
-        <p:nvSpPr>
-          <p:cNvPr id="122" name="TextBox 121">
-            <a:extLst>
-              <a:ext uri="{FF2B5EF4-FFF2-40B4-BE49-F238E27FC236}">
-                <a16:creationId xmlns:a16="http://schemas.microsoft.com/office/drawing/2014/main" id="{3DDAFDB5-8987-43DC-93C9-AA0B6E46E559}"/>
-              </a:ext>
-            </a:extLst>
-          </p:cNvPr>
-          <p:cNvSpPr txBox="1"/>
-          <p:nvPr/>
-        </p:nvSpPr>
-        <p:spPr>
-          <a:xfrm>
-            <a:off x="3351231" y="2391596"/>
-            <a:ext cx="2740750" cy="307777"/>
-          </a:xfrm>
-          <a:prstGeom prst="rect">
-            <a:avLst/>
-          </a:prstGeom>
-          <a:noFill/>
-        </p:spPr>
-        <p:txBody>
-          <a:bodyPr wrap="none" rtlCol="0">
-            <a:spAutoFit/>
-          </a:bodyPr>
-          <a:lstStyle/>
-          <a:p>
-            <a:r>
-              <a:rPr lang="en-US" sz="1400" dirty="0" err="1"/>
-              <a:t>component_descriptors</a:t>
-            </a:r>
-            <a:r>
-              <a:rPr lang="en-US" sz="1400" dirty="0"/>
-              <a:t>/&lt;</a:t>
-            </a:r>
-            <a:r>
-              <a:rPr lang="en-US" sz="1400" dirty="0" err="1"/>
-              <a:t>CompId</a:t>
-            </a:r>
-            <a:r>
-              <a:rPr lang="en-US" sz="1400" dirty="0"/>
-              <a:t>&gt;</a:t>
-            </a:r>
-          </a:p>
-        </p:txBody>
-      </p:sp>
-      <p:cxnSp>
-        <p:nvCxnSpPr>
-          <p:cNvPr id="123" name="Connector: Elbow 122">
-            <a:extLst>
-              <a:ext uri="{FF2B5EF4-FFF2-40B4-BE49-F238E27FC236}">
-                <a16:creationId xmlns:a16="http://schemas.microsoft.com/office/drawing/2014/main" id="{B436BE47-DE0A-4143-9951-5C8B4E8542B5}"/>
-              </a:ext>
-            </a:extLst>
-          </p:cNvPr>
-          <p:cNvCxnSpPr>
-            <a:cxnSpLocks/>
-            <a:stCxn id="12" idx="0"/>
-            <a:endCxn id="118" idx="3"/>
-          </p:cNvCxnSpPr>
-          <p:nvPr/>
-        </p:nvCxnSpPr>
-        <p:spPr>
-          <a:xfrm rot="16200000" flipV="1">
-            <a:off x="5581963" y="2587089"/>
-            <a:ext cx="338906" cy="820642"/>
-          </a:xfrm>
-          <a:prstGeom prst="bentConnector2">
-            <a:avLst/>
-          </a:prstGeom>
-          <a:ln>
-            <a:solidFill>
+            </a:lnRef>
+            <a:fillRef idx="0">
               <a:schemeClr val="accent1"/>
-            </a:solidFill>
-            <a:prstDash val="sysDot"/>
-            <a:tailEnd type="none"/>
-          </a:ln>
-        </p:spPr>
-        <p:style>
-          <a:lnRef idx="1">
-            <a:schemeClr val="accent1"/>
-          </a:lnRef>
-          <a:fillRef idx="0">
-            <a:schemeClr val="accent1"/>
-          </a:fillRef>
-          <a:effectRef idx="0">
-            <a:schemeClr val="accent1"/>
-          </a:effectRef>
-          <a:fontRef idx="minor">
-            <a:schemeClr val="tx1"/>
-          </a:fontRef>
-        </p:style>
-      </p:cxnSp>
-      <p:cxnSp>
-        <p:nvCxnSpPr>
-          <p:cNvPr id="126" name="Connector: Elbow 125">
-            <a:extLst>
-              <a:ext uri="{FF2B5EF4-FFF2-40B4-BE49-F238E27FC236}">
-                <a16:creationId xmlns:a16="http://schemas.microsoft.com/office/drawing/2014/main" id="{56174D1E-69B1-42C0-8662-33C4BA04D18D}"/>
-              </a:ext>
-            </a:extLst>
-          </p:cNvPr>
-          <p:cNvCxnSpPr>
-            <a:cxnSpLocks/>
-            <a:stCxn id="14" idx="3"/>
-            <a:endCxn id="118" idx="2"/>
-          </p:cNvCxnSpPr>
-          <p:nvPr/>
-        </p:nvCxnSpPr>
-        <p:spPr>
-          <a:xfrm flipV="1">
-            <a:off x="4387505" y="3012623"/>
-            <a:ext cx="358876" cy="720814"/>
-          </a:xfrm>
-          <a:prstGeom prst="bentConnector2">
-            <a:avLst/>
-          </a:prstGeom>
-          <a:ln>
-            <a:solidFill>
+            </a:fillRef>
+            <a:effectRef idx="0">
               <a:schemeClr val="accent1"/>
-            </a:solidFill>
-            <a:prstDash val="sysDot"/>
-            <a:tailEnd type="none"/>
-          </a:ln>
-        </p:spPr>
-        <p:style>
-          <a:lnRef idx="1">
-            <a:schemeClr val="accent1"/>
-          </a:lnRef>
-          <a:fillRef idx="0">
-            <a:schemeClr val="accent1"/>
-          </a:fillRef>
-          <a:effectRef idx="0">
-            <a:schemeClr val="accent1"/>
-          </a:effectRef>
-          <a:fontRef idx="minor">
-            <a:schemeClr val="tx1"/>
-          </a:fontRef>
-        </p:style>
-      </p:cxnSp>
+            </a:effectRef>
+            <a:fontRef idx="minor">
+              <a:schemeClr val="tx1"/>
+            </a:fontRef>
+          </p:style>
+        </p:cxnSp>
+        <p:sp>
+          <p:nvSpPr>
+            <p:cNvPr id="118" name="TextBox 117">
+              <a:extLst>
+                <a:ext uri="{FF2B5EF4-FFF2-40B4-BE49-F238E27FC236}">
+                  <a16:creationId xmlns:a16="http://schemas.microsoft.com/office/drawing/2014/main" id="{CADC1FB8-FF77-4731-9EEC-027A9E5D992B}"/>
+                </a:ext>
+              </a:extLst>
+            </p:cNvPr>
+            <p:cNvSpPr txBox="1"/>
+            <p:nvPr/>
+          </p:nvSpPr>
+          <p:spPr>
+            <a:xfrm>
+              <a:off x="4151667" y="2643291"/>
+              <a:ext cx="1189428" cy="369332"/>
+            </a:xfrm>
+            <a:prstGeom prst="rect">
+              <a:avLst/>
+            </a:prstGeom>
+            <a:noFill/>
+          </p:spPr>
+          <p:txBody>
+            <a:bodyPr wrap="none" rtlCol="0">
+              <a:spAutoFit/>
+            </a:bodyPr>
+            <a:lstStyle/>
+            <a:p>
+              <a:r>
+                <a:rPr lang="en-US" dirty="0"/>
+                <a:t>Repository</a:t>
+              </a:r>
+            </a:p>
+          </p:txBody>
+        </p:sp>
+        <p:sp>
+          <p:nvSpPr>
+            <p:cNvPr id="122" name="TextBox 121">
+              <a:extLst>
+                <a:ext uri="{FF2B5EF4-FFF2-40B4-BE49-F238E27FC236}">
+                  <a16:creationId xmlns:a16="http://schemas.microsoft.com/office/drawing/2014/main" id="{3DDAFDB5-8987-43DC-93C9-AA0B6E46E559}"/>
+                </a:ext>
+              </a:extLst>
+            </p:cNvPr>
+            <p:cNvSpPr txBox="1"/>
+            <p:nvPr/>
+          </p:nvSpPr>
+          <p:spPr>
+            <a:xfrm>
+              <a:off x="3351231" y="2391596"/>
+              <a:ext cx="2740750" cy="307777"/>
+            </a:xfrm>
+            <a:prstGeom prst="rect">
+              <a:avLst/>
+            </a:prstGeom>
+            <a:noFill/>
+          </p:spPr>
+          <p:txBody>
+            <a:bodyPr wrap="none" rtlCol="0">
+              <a:spAutoFit/>
+            </a:bodyPr>
+            <a:lstStyle/>
+            <a:p>
+              <a:r>
+                <a:rPr lang="en-US" sz="1400" dirty="0" err="1"/>
+                <a:t>component_descriptors</a:t>
+              </a:r>
+              <a:r>
+                <a:rPr lang="en-US" sz="1400" dirty="0"/>
+                <a:t>/&lt;</a:t>
+              </a:r>
+              <a:r>
+                <a:rPr lang="en-US" sz="1400" dirty="0" err="1"/>
+                <a:t>CompId</a:t>
+              </a:r>
+              <a:r>
+                <a:rPr lang="en-US" sz="1400" dirty="0"/>
+                <a:t>&gt;</a:t>
+              </a:r>
+            </a:p>
+          </p:txBody>
+        </p:sp>
+        <p:cxnSp>
+          <p:nvCxnSpPr>
+            <p:cNvPr id="123" name="Connector: Elbow 122">
+              <a:extLst>
+                <a:ext uri="{FF2B5EF4-FFF2-40B4-BE49-F238E27FC236}">
+                  <a16:creationId xmlns:a16="http://schemas.microsoft.com/office/drawing/2014/main" id="{B436BE47-DE0A-4143-9951-5C8B4E8542B5}"/>
+                </a:ext>
+              </a:extLst>
+            </p:cNvPr>
+            <p:cNvCxnSpPr>
+              <a:cxnSpLocks/>
+              <a:stCxn id="12" idx="0"/>
+              <a:endCxn id="118" idx="3"/>
+            </p:cNvCxnSpPr>
+            <p:nvPr/>
+          </p:nvCxnSpPr>
+          <p:spPr>
+            <a:xfrm rot="16200000" flipV="1">
+              <a:off x="5581963" y="2587089"/>
+              <a:ext cx="338906" cy="820642"/>
+            </a:xfrm>
+            <a:prstGeom prst="bentConnector2">
+              <a:avLst/>
+            </a:prstGeom>
+            <a:ln>
+              <a:solidFill>
+                <a:schemeClr val="accent1"/>
+              </a:solidFill>
+              <a:prstDash val="sysDot"/>
+              <a:tailEnd type="none"/>
+            </a:ln>
+          </p:spPr>
+          <p:style>
+            <a:lnRef idx="1">
+              <a:schemeClr val="accent1"/>
+            </a:lnRef>
+            <a:fillRef idx="0">
+              <a:schemeClr val="accent1"/>
+            </a:fillRef>
+            <a:effectRef idx="0">
+              <a:schemeClr val="accent1"/>
+            </a:effectRef>
+            <a:fontRef idx="minor">
+              <a:schemeClr val="tx1"/>
+            </a:fontRef>
+          </p:style>
+        </p:cxnSp>
+        <p:cxnSp>
+          <p:nvCxnSpPr>
+            <p:cNvPr id="126" name="Connector: Elbow 125">
+              <a:extLst>
+                <a:ext uri="{FF2B5EF4-FFF2-40B4-BE49-F238E27FC236}">
+                  <a16:creationId xmlns:a16="http://schemas.microsoft.com/office/drawing/2014/main" id="{56174D1E-69B1-42C0-8662-33C4BA04D18D}"/>
+                </a:ext>
+              </a:extLst>
+            </p:cNvPr>
+            <p:cNvCxnSpPr>
+              <a:cxnSpLocks/>
+              <a:stCxn id="14" idx="3"/>
+              <a:endCxn id="118" idx="2"/>
+            </p:cNvCxnSpPr>
+            <p:nvPr/>
+          </p:nvCxnSpPr>
+          <p:spPr>
+            <a:xfrm flipV="1">
+              <a:off x="4387505" y="3012623"/>
+              <a:ext cx="358876" cy="720814"/>
+            </a:xfrm>
+            <a:prstGeom prst="bentConnector2">
+              <a:avLst/>
+            </a:prstGeom>
+            <a:ln>
+              <a:solidFill>
+                <a:schemeClr val="accent1"/>
+              </a:solidFill>
+              <a:prstDash val="sysDot"/>
+              <a:tailEnd type="none"/>
+            </a:ln>
+          </p:spPr>
+          <p:style>
+            <a:lnRef idx="1">
+              <a:schemeClr val="accent1"/>
+            </a:lnRef>
+            <a:fillRef idx="0">
+              <a:schemeClr val="accent1"/>
+            </a:fillRef>
+            <a:effectRef idx="0">
+              <a:schemeClr val="accent1"/>
+            </a:effectRef>
+            <a:fontRef idx="minor">
+              <a:schemeClr val="tx1"/>
+            </a:fontRef>
+          </p:style>
+        </p:cxnSp>
+      </p:grpSp>
       <p:sp>
         <p:nvSpPr>
           <p:cNvPr id="129" name="TextBox 128">
@@ -12155,41 +12178,41 @@
 </file>
 
 <file path=customXml/item1.xml><?xml version="1.0" encoding="utf-8"?>
+<TemplafyFormConfiguration><![CDATA[{"formFields":[],"formDataEntries":[]}]]></TemplafyFormConfiguration>
+</file>
+
+<file path=customXml/item2.xml><?xml version="1.0" encoding="utf-8"?>
 <TemplafyTemplateConfiguration><![CDATA[{"elementsMetadata":[],"transformationConfigurations":[],"templateName":"blankpresentation","templateDescription":"","enableDocumentContentUpdater":false,"version":"2.0"}]]></TemplafyTemplateConfiguration>
 </file>
 
-<file path=customXml/item2.xml><?xml version="1.0" encoding="utf-8"?>
-<TemplafyFormConfiguration><![CDATA[{"formFields":[],"formDataEntries":[]}]]></TemplafyFormConfiguration>
+<file path=customXml/item3.xml><?xml version="1.0" encoding="utf-8"?>
+<TemplafySlideFormConfiguration><![CDATA[{"formFields":[],"formDataEntries":[]}]]></TemplafySlideFormConfiguration>
 </file>
 
-<file path=customXml/item3.xml><?xml version="1.0" encoding="utf-8"?>
+<file path=customXml/item4.xml><?xml version="1.0" encoding="utf-8"?>
 <TemplafySlideTemplateConfiguration><![CDATA[{"slideVersion":1,"isValidatorEnabled":false,"isLocked":false,"elementsMetadata":[],"slideId":"637924315346077163","enableDocumentContentUpdater":false,"version":"2.0"}]]></TemplafySlideTemplateConfiguration>
 </file>
 
-<file path=customXml/item4.xml><?xml version="1.0" encoding="utf-8"?>
-<TemplafySlideFormConfiguration><![CDATA[{"formFields":[],"formDataEntries":[]}]]></TemplafySlideFormConfiguration>
+<file path=customXml/itemProps1.xml><?xml version="1.0" encoding="utf-8"?>
+<ds:datastoreItem xmlns:ds="http://schemas.openxmlformats.org/officeDocument/2006/customXml" ds:itemID="{21E4BB68-DBE0-4174-BF38-A8F24AA97E06}">
+  <ds:schemaRefs/>
+</ds:datastoreItem>
 </file>
 
-<file path=customXml/itemProps1.xml><?xml version="1.0" encoding="utf-8"?>
+<file path=customXml/itemProps2.xml><?xml version="1.0" encoding="utf-8"?>
 <ds:datastoreItem xmlns:ds="http://schemas.openxmlformats.org/officeDocument/2006/customXml" ds:itemID="{1E5C1412-4B31-4EB2-BCFB-90DC85E0549F}">
   <ds:schemaRefs/>
 </ds:datastoreItem>
 </file>
 
-<file path=customXml/itemProps2.xml><?xml version="1.0" encoding="utf-8"?>
-<ds:datastoreItem xmlns:ds="http://schemas.openxmlformats.org/officeDocument/2006/customXml" ds:itemID="{21E4BB68-DBE0-4174-BF38-A8F24AA97E06}">
-  <ds:schemaRefs/>
-</ds:datastoreItem>
-</file>
-
 <file path=customXml/itemProps3.xml><?xml version="1.0" encoding="utf-8"?>
-<ds:datastoreItem xmlns:ds="http://schemas.openxmlformats.org/officeDocument/2006/customXml" ds:itemID="{DAEC0FB5-7FB8-4E5D-836C-D6122B8C2BC6}">
+<ds:datastoreItem xmlns:ds="http://schemas.openxmlformats.org/officeDocument/2006/customXml" ds:itemID="{B7907530-0CC5-4229-9EFB-458F577AA3A6}">
   <ds:schemaRefs/>
 </ds:datastoreItem>
 </file>
 
 <file path=customXml/itemProps4.xml><?xml version="1.0" encoding="utf-8"?>
-<ds:datastoreItem xmlns:ds="http://schemas.openxmlformats.org/officeDocument/2006/customXml" ds:itemID="{B7907530-0CC5-4229-9EFB-458F577AA3A6}">
+<ds:datastoreItem xmlns:ds="http://schemas.openxmlformats.org/officeDocument/2006/customXml" ds:itemID="{DAEC0FB5-7FB8-4E5D-836C-D6122B8C2BC6}">
   <ds:schemaRefs/>
 </ds:datastoreItem>
 </file>
</xml_diff>